<commit_message>
Updated session 7 materials
</commit_message>
<xml_diff>
--- a/Session7/Session7_Slides.pptx
+++ b/Session7/Session7_Slides.pptx
@@ -40,13 +40,6 @@
     <p:sldId id="285" r:id="rId37"/>
     <p:sldId id="286" r:id="rId38"/>
     <p:sldId id="287" r:id="rId39"/>
-    <p:sldId id="288" r:id="rId40"/>
-    <p:sldId id="289" r:id="rId41"/>
-    <p:sldId id="290" r:id="rId42"/>
-    <p:sldId id="291" r:id="rId43"/>
-    <p:sldId id="292" r:id="rId44"/>
-    <p:sldId id="293" r:id="rId45"/>
-    <p:sldId id="294" r:id="rId46"/>
   </p:sldIdLst>
   <p:sldSz cx="13004800" cy="9753600"/>
   <p:notesSz cx="6858000" cy="9144000"/>
@@ -5709,7 +5702,7 @@
           <a:p>
             <a:pPr/>
             <a:r>
-              <a:t>Looking at top rows</a:t>
+              <a:t>Sorting</a:t>
             </a:r>
           </a:p>
         </p:txBody>
@@ -5722,8 +5715,8 @@
         </p:nvSpPr>
         <p:spPr>
           <a:xfrm>
-            <a:off x="455296" y="4826000"/>
-            <a:ext cx="12192002" cy="1955801"/>
+            <a:off x="434394" y="4286249"/>
+            <a:ext cx="12946701" cy="3035301"/>
           </a:xfrm>
           <a:prstGeom prst="rect">
             <a:avLst/>
@@ -5752,7 +5745,31 @@
               </a:defRPr>
             </a:pPr>
             <a:r>
-              <a:t>new_df.head()</a:t>
+              <a:t>df.sort_values(“revenue”,</a:t>
+            </a:r>
+          </a:p>
+          <a:p>
+            <a:pPr>
+              <a:defRPr sz="5100">
+                <a:latin typeface="Anonymous Pro for Powerline"/>
+                <a:ea typeface="Anonymous Pro for Powerline"/>
+                <a:cs typeface="Anonymous Pro for Powerline"/>
+                <a:sym typeface="Anonymous Pro for Powerline"/>
+              </a:defRPr>
+            </a:pPr>
+            <a:r>
+              <a:t>               </a:t>
+            </a:r>
+            <a:r>
+              <a:rPr>
+                <a:solidFill>
+                  <a:schemeClr val="accent3"/>
+                </a:solidFill>
+              </a:rPr>
+              <a:t>ascending=False</a:t>
+            </a:r>
+            <a:r>
+              <a:t>)</a:t>
             </a:r>
           </a:p>
           <a:p>
@@ -5806,8 +5823,8 @@
         </p:nvSpPr>
         <p:spPr>
           <a:xfrm>
-            <a:off x="406400" y="1536700"/>
-            <a:ext cx="12192000" cy="1169260"/>
+            <a:off x="3581470" y="4295688"/>
+            <a:ext cx="6376971" cy="1794627"/>
           </a:xfrm>
           <a:prstGeom prst="rect">
             <a:avLst/>
@@ -5816,73 +5833,14 @@
         <p:txBody>
           <a:bodyPr/>
           <a:lstStyle>
-            <a:lvl1pPr defTabSz="403097">
-              <a:spcBef>
-                <a:spcPts val="1900"/>
-              </a:spcBef>
-              <a:defRPr sz="8280"/>
+            <a:lvl1pPr defTabSz="455675">
+              <a:defRPr sz="13259"/>
             </a:lvl1pPr>
           </a:lstStyle>
           <a:p>
             <a:pPr/>
             <a:r>
-              <a:t>Using Numpy functions</a:t>
-            </a:r>
-          </a:p>
-        </p:txBody>
-      </p:sp>
-      <p:sp>
-        <p:nvSpPr>
-          <p:cNvPr id="235" name="Shape 235"/>
-          <p:cNvSpPr/>
-          <p:nvPr/>
-        </p:nvSpPr>
-        <p:spPr>
-          <a:xfrm>
-            <a:off x="455296" y="4826000"/>
-            <a:ext cx="12192002" cy="1955801"/>
-          </a:xfrm>
-          <a:prstGeom prst="rect">
-            <a:avLst/>
-          </a:prstGeom>
-          <a:ln w="12700">
-            <a:miter lim="400000"/>
-          </a:ln>
-          <a:extLst>
-            <a:ext uri="{C572A759-6A51-4108-AA02-DFA0A04FC94B}">
-              <ma14:wrappingTextBoxFlag xmlns:ma14="http://schemas.microsoft.com/office/mac/drawingml/2011/main" val="1"/>
-            </a:ext>
-          </a:extLst>
-        </p:spPr>
-        <p:txBody>
-          <a:bodyPr lIns="50800" tIns="50800" rIns="50800" bIns="50800" anchor="ctr">
-            <a:spAutoFit/>
-          </a:bodyPr>
-          <a:lstStyle/>
-          <a:p>
-            <a:pPr>
-              <a:defRPr sz="5100">
-                <a:latin typeface="Anonymous Pro for Powerline"/>
-                <a:ea typeface="Anonymous Pro for Powerline"/>
-                <a:cs typeface="Anonymous Pro for Powerline"/>
-                <a:sym typeface="Anonymous Pro for Powerline"/>
-              </a:defRPr>
-            </a:pPr>
-            <a:r>
-              <a:t>new_df[‘score’].mean()</a:t>
-            </a:r>
-          </a:p>
-          <a:p>
-            <a:pPr>
-              <a:defRPr sz="5100">
-                <a:latin typeface="Anonymous Pro for Powerline"/>
-                <a:ea typeface="Anonymous Pro for Powerline"/>
-                <a:cs typeface="Anonymous Pro for Powerline"/>
-                <a:sym typeface="Anonymous Pro for Powerline"/>
-              </a:defRPr>
-            </a:pPr>
-            <a:r>
-              <a:t> </a:t>
+              <a:t>Exercises</a:t>
             </a:r>
           </a:p>
         </p:txBody>
@@ -5915,7 +5873,7 @@
       </p:grpSpPr>
       <p:sp>
         <p:nvSpPr>
-          <p:cNvPr id="237" name="Shape 237"/>
+          <p:cNvPr id="236" name="Shape 236"/>
           <p:cNvSpPr/>
           <p:nvPr>
             <p:ph type="title"/>
@@ -5923,8 +5881,8 @@
         </p:nvSpPr>
         <p:spPr>
           <a:xfrm>
-            <a:off x="406400" y="1536700"/>
-            <a:ext cx="12192000" cy="1169260"/>
+            <a:off x="3581470" y="4295688"/>
+            <a:ext cx="6376971" cy="1794627"/>
           </a:xfrm>
           <a:prstGeom prst="rect">
             <a:avLst/>
@@ -5933,86 +5891,14 @@
         <p:txBody>
           <a:bodyPr/>
           <a:lstStyle>
-            <a:lvl1pPr defTabSz="403097">
-              <a:spcBef>
-                <a:spcPts val="1900"/>
-              </a:spcBef>
-              <a:defRPr sz="8280"/>
+            <a:lvl1pPr defTabSz="455675">
+              <a:defRPr sz="13259"/>
             </a:lvl1pPr>
           </a:lstStyle>
           <a:p>
             <a:pPr/>
             <a:r>
-              <a:t>Creating a new Column</a:t>
-            </a:r>
-          </a:p>
-        </p:txBody>
-      </p:sp>
-      <p:sp>
-        <p:nvSpPr>
-          <p:cNvPr id="238" name="Shape 238"/>
-          <p:cNvSpPr/>
-          <p:nvPr/>
-        </p:nvSpPr>
-        <p:spPr>
-          <a:xfrm>
-            <a:off x="434394" y="4286249"/>
-            <a:ext cx="12136011" cy="3035301"/>
-          </a:xfrm>
-          <a:prstGeom prst="rect">
-            <a:avLst/>
-          </a:prstGeom>
-          <a:ln w="12700">
-            <a:miter lim="400000"/>
-          </a:ln>
-          <a:extLst>
-            <a:ext uri="{C572A759-6A51-4108-AA02-DFA0A04FC94B}">
-              <ma14:wrappingTextBoxFlag xmlns:ma14="http://schemas.microsoft.com/office/mac/drawingml/2011/main" val="1"/>
-            </a:ext>
-          </a:extLst>
-        </p:spPr>
-        <p:txBody>
-          <a:bodyPr lIns="50800" tIns="50800" rIns="50800" bIns="50800" anchor="ctr">
-            <a:spAutoFit/>
-          </a:bodyPr>
-          <a:lstStyle/>
-          <a:p>
-            <a:pPr>
-              <a:defRPr sz="5100">
-                <a:latin typeface="Anonymous Pro for Powerline"/>
-                <a:ea typeface="Anonymous Pro for Powerline"/>
-                <a:cs typeface="Anonymous Pro for Powerline"/>
-                <a:sym typeface="Anonymous Pro for Powerline"/>
-              </a:defRPr>
-            </a:pPr>
-            <a:r>
-              <a:t>df[‘profit’] = </a:t>
-            </a:r>
-          </a:p>
-          <a:p>
-            <a:pPr>
-              <a:defRPr sz="5100">
-                <a:latin typeface="Anonymous Pro for Powerline"/>
-                <a:ea typeface="Anonymous Pro for Powerline"/>
-                <a:cs typeface="Anonymous Pro for Powerline"/>
-                <a:sym typeface="Anonymous Pro for Powerline"/>
-              </a:defRPr>
-            </a:pPr>
-            <a:r>
-              <a:t>    df[‘revenue’] - df[‘expenses’]</a:t>
-            </a:r>
-          </a:p>
-          <a:p>
-            <a:pPr>
-              <a:defRPr sz="5100">
-                <a:latin typeface="Anonymous Pro for Powerline"/>
-                <a:ea typeface="Anonymous Pro for Powerline"/>
-                <a:cs typeface="Anonymous Pro for Powerline"/>
-                <a:sym typeface="Anonymous Pro for Powerline"/>
-              </a:defRPr>
-            </a:pPr>
-            <a:r>
-              <a:t> </a:t>
+              <a:t>Grouping</a:t>
             </a:r>
           </a:p>
         </p:txBody>
@@ -6045,7 +5931,7 @@
       </p:grpSpPr>
       <p:sp>
         <p:nvSpPr>
-          <p:cNvPr id="240" name="Shape 240"/>
+          <p:cNvPr id="238" name="Shape 238"/>
           <p:cNvSpPr/>
           <p:nvPr>
             <p:ph type="title"/>
@@ -6073,21 +5959,21 @@
           <a:p>
             <a:pPr/>
             <a:r>
-              <a:t>Dataframe from columns</a:t>
-            </a:r>
-          </a:p>
-        </p:txBody>
-      </p:sp>
-      <p:sp>
-        <p:nvSpPr>
-          <p:cNvPr id="241" name="Shape 241"/>
+              <a:t>Counting Unique values</a:t>
+            </a:r>
+          </a:p>
+        </p:txBody>
+      </p:sp>
+      <p:sp>
+        <p:nvSpPr>
+          <p:cNvPr id="239" name="Shape 239"/>
           <p:cNvSpPr/>
           <p:nvPr/>
         </p:nvSpPr>
         <p:spPr>
           <a:xfrm>
-            <a:off x="434394" y="5365750"/>
-            <a:ext cx="12946701" cy="876301"/>
+            <a:off x="227675" y="4369987"/>
+            <a:ext cx="12549449" cy="1955801"/>
           </a:xfrm>
           <a:prstGeom prst="rect">
             <a:avLst/>
@@ -6105,20 +5991,31 @@
           <a:bodyPr lIns="50800" tIns="50800" rIns="50800" bIns="50800" anchor="ctr">
             <a:spAutoFit/>
           </a:bodyPr>
-          <a:lstStyle>
-            <a:lvl1pPr>
+          <a:lstStyle/>
+          <a:p>
+            <a:pPr>
               <a:defRPr sz="5100">
                 <a:latin typeface="Anonymous Pro for Powerline"/>
                 <a:ea typeface="Anonymous Pro for Powerline"/>
                 <a:cs typeface="Anonymous Pro for Powerline"/>
                 <a:sym typeface="Anonymous Pro for Powerline"/>
               </a:defRPr>
-            </a:lvl1pPr>
-          </a:lstStyle>
-          <a:p>
-            <a:pPr/>
-            <a:r>
-              <a:t>df[[‘revenue’, ‘profit’]]</a:t>
+            </a:pPr>
+            <a:r>
+              <a:t>df[‘first_name’].value_counts()</a:t>
+            </a:r>
+          </a:p>
+          <a:p>
+            <a:pPr>
+              <a:defRPr sz="5100">
+                <a:latin typeface="Anonymous Pro for Powerline"/>
+                <a:ea typeface="Anonymous Pro for Powerline"/>
+                <a:cs typeface="Anonymous Pro for Powerline"/>
+                <a:sym typeface="Anonymous Pro for Powerline"/>
+              </a:defRPr>
+            </a:pPr>
+            <a:r>
+              <a:t> </a:t>
             </a:r>
           </a:p>
         </p:txBody>
@@ -6151,7 +6048,7 @@
       </p:grpSpPr>
       <p:sp>
         <p:nvSpPr>
-          <p:cNvPr id="243" name="Shape 243"/>
+          <p:cNvPr id="241" name="Shape 241"/>
           <p:cNvSpPr/>
           <p:nvPr>
             <p:ph type="title"/>
@@ -6179,21 +6076,21 @@
           <a:p>
             <a:pPr/>
             <a:r>
-              <a:t>Sorting</a:t>
-            </a:r>
-          </a:p>
-        </p:txBody>
-      </p:sp>
-      <p:sp>
-        <p:nvSpPr>
-          <p:cNvPr id="244" name="Shape 244"/>
+              <a:t>Counting Unique values</a:t>
+            </a:r>
+          </a:p>
+        </p:txBody>
+      </p:sp>
+      <p:sp>
+        <p:nvSpPr>
+          <p:cNvPr id="242" name="Shape 242"/>
           <p:cNvSpPr/>
           <p:nvPr/>
         </p:nvSpPr>
         <p:spPr>
           <a:xfrm>
-            <a:off x="434394" y="4286249"/>
-            <a:ext cx="12946701" cy="3035301"/>
+            <a:off x="227675" y="4369987"/>
+            <a:ext cx="12549449" cy="1955801"/>
           </a:xfrm>
           <a:prstGeom prst="rect">
             <a:avLst/>
@@ -6222,7 +6119,7 @@
               </a:defRPr>
             </a:pPr>
             <a:r>
-              <a:t>df.sort_values(“revenue”,</a:t>
+              <a:t>df[‘first_name’].value_counts()</a:t>
             </a:r>
           </a:p>
           <a:p>
@@ -6235,31 +6132,187 @@
               </a:defRPr>
             </a:pPr>
             <a:r>
-              <a:t>               </a:t>
-            </a:r>
-            <a:r>
-              <a:rPr>
+              <a:t> </a:t>
+            </a:r>
+          </a:p>
+        </p:txBody>
+      </p:sp>
+      <p:sp>
+        <p:nvSpPr>
+          <p:cNvPr id="243" name="Shape 243"/>
+          <p:cNvSpPr/>
+          <p:nvPr/>
+        </p:nvSpPr>
+        <p:spPr>
+          <a:xfrm rot="21591301">
+            <a:off x="458640" y="6227488"/>
+            <a:ext cx="1620784" cy="518251"/>
+          </a:xfrm>
+          <a:prstGeom prst="rightArrow">
+            <a:avLst>
+              <a:gd name="adj1" fmla="val 34174"/>
+              <a:gd name="adj2" fmla="val 145948"/>
+            </a:avLst>
+          </a:prstGeom>
+          <a:solidFill>
+            <a:schemeClr val="accent5"/>
+          </a:solidFill>
+          <a:ln w="12700">
+            <a:miter lim="400000"/>
+          </a:ln>
+        </p:spPr>
+        <p:txBody>
+          <a:bodyPr lIns="50800" tIns="50800" rIns="50800" bIns="50800" anchor="ctr"/>
+          <a:lstStyle/>
+          <a:p>
+            <a:pPr algn="ctr">
+              <a:lnSpc>
+                <a:spcPct val="80000"/>
+              </a:lnSpc>
+              <a:spcBef>
+                <a:spcPts val="0"/>
+              </a:spcBef>
+              <a:defRPr cap="all" sz="2800">
                 <a:solidFill>
-                  <a:schemeClr val="accent3"/>
+                  <a:srgbClr val="FFFFFF"/>
                 </a:solidFill>
-              </a:rPr>
-              <a:t>ascending=False</a:t>
-            </a:r>
-            <a:r>
-              <a:t>)</a:t>
-            </a:r>
-          </a:p>
-          <a:p>
-            <a:pPr>
-              <a:defRPr sz="5100">
-                <a:latin typeface="Anonymous Pro for Powerline"/>
-                <a:ea typeface="Anonymous Pro for Powerline"/>
-                <a:cs typeface="Anonymous Pro for Powerline"/>
-                <a:sym typeface="Anonymous Pro for Powerline"/>
+                <a:latin typeface="+mn-lt"/>
+                <a:ea typeface="+mn-ea"/>
+                <a:cs typeface="+mn-cs"/>
+                <a:sym typeface="DIN Condensed"/>
               </a:defRPr>
             </a:pPr>
-            <a:r>
-              <a:t> </a:t>
+          </a:p>
+        </p:txBody>
+      </p:sp>
+      <p:sp>
+        <p:nvSpPr>
+          <p:cNvPr id="244" name="Shape 244"/>
+          <p:cNvSpPr/>
+          <p:nvPr/>
+        </p:nvSpPr>
+        <p:spPr>
+          <a:xfrm>
+            <a:off x="2278932" y="5914977"/>
+            <a:ext cx="4181857" cy="1143001"/>
+          </a:xfrm>
+          <a:prstGeom prst="rect">
+            <a:avLst/>
+          </a:prstGeom>
+          <a:ln w="12700">
+            <a:miter lim="400000"/>
+          </a:ln>
+          <a:extLst>
+            <a:ext uri="{C572A759-6A51-4108-AA02-DFA0A04FC94B}">
+              <ma14:wrappingTextBoxFlag xmlns:ma14="http://schemas.microsoft.com/office/mac/drawingml/2011/main" val="1"/>
+            </a:ext>
+          </a:extLst>
+        </p:spPr>
+        <p:txBody>
+          <a:bodyPr wrap="none" lIns="50800" tIns="50800" rIns="50800" bIns="50800" anchor="ctr">
+            <a:spAutoFit/>
+          </a:bodyPr>
+          <a:lstStyle>
+            <a:lvl1pPr>
+              <a:defRPr sz="6000">
+                <a:solidFill>
+                  <a:schemeClr val="accent5"/>
+                </a:solidFill>
+              </a:defRPr>
+            </a:lvl1pPr>
+          </a:lstStyle>
+          <a:p>
+            <a:pPr/>
+            <a:r>
+              <a:t>“John”: 352</a:t>
+            </a:r>
+          </a:p>
+        </p:txBody>
+      </p:sp>
+      <p:sp>
+        <p:nvSpPr>
+          <p:cNvPr id="245" name="Shape 245"/>
+          <p:cNvSpPr/>
+          <p:nvPr/>
+        </p:nvSpPr>
+        <p:spPr>
+          <a:xfrm>
+            <a:off x="2278932" y="7156344"/>
+            <a:ext cx="4338829" cy="1143001"/>
+          </a:xfrm>
+          <a:prstGeom prst="rect">
+            <a:avLst/>
+          </a:prstGeom>
+          <a:ln w="12700">
+            <a:miter lim="400000"/>
+          </a:ln>
+          <a:extLst>
+            <a:ext uri="{C572A759-6A51-4108-AA02-DFA0A04FC94B}">
+              <ma14:wrappingTextBoxFlag xmlns:ma14="http://schemas.microsoft.com/office/mac/drawingml/2011/main" val="1"/>
+            </a:ext>
+          </a:extLst>
+        </p:spPr>
+        <p:txBody>
+          <a:bodyPr wrap="none" lIns="50800" tIns="50800" rIns="50800" bIns="50800" anchor="ctr">
+            <a:spAutoFit/>
+          </a:bodyPr>
+          <a:lstStyle>
+            <a:lvl1pPr>
+              <a:defRPr sz="6000">
+                <a:solidFill>
+                  <a:schemeClr val="accent5"/>
+                </a:solidFill>
+              </a:defRPr>
+            </a:lvl1pPr>
+          </a:lstStyle>
+          <a:p>
+            <a:pPr/>
+            <a:r>
+              <a:t>“Chris”: 280</a:t>
+            </a:r>
+          </a:p>
+        </p:txBody>
+      </p:sp>
+      <p:sp>
+        <p:nvSpPr>
+          <p:cNvPr id="246" name="Shape 246"/>
+          <p:cNvSpPr/>
+          <p:nvPr/>
+        </p:nvSpPr>
+        <p:spPr>
+          <a:xfrm>
+            <a:off x="2419522" y="8397712"/>
+            <a:ext cx="4057651" cy="1143001"/>
+          </a:xfrm>
+          <a:prstGeom prst="rect">
+            <a:avLst/>
+          </a:prstGeom>
+          <a:ln w="12700">
+            <a:miter lim="400000"/>
+          </a:ln>
+          <a:extLst>
+            <a:ext uri="{C572A759-6A51-4108-AA02-DFA0A04FC94B}">
+              <ma14:wrappingTextBoxFlag xmlns:ma14="http://schemas.microsoft.com/office/mac/drawingml/2011/main" val="1"/>
+            </a:ext>
+          </a:extLst>
+        </p:spPr>
+        <p:txBody>
+          <a:bodyPr wrap="none" lIns="50800" tIns="50800" rIns="50800" bIns="50800" anchor="ctr">
+            <a:spAutoFit/>
+          </a:bodyPr>
+          <a:lstStyle>
+            <a:lvl1pPr>
+              <a:defRPr sz="6000">
+                <a:solidFill>
+                  <a:schemeClr val="accent5"/>
+                </a:solidFill>
+              </a:defRPr>
+            </a:lvl1pPr>
+          </a:lstStyle>
+          <a:p>
+            <a:pPr/>
+            <a:r>
+              <a:t>“Tom”: 264</a:t>
             </a:r>
           </a:p>
         </p:txBody>
@@ -6292,7 +6345,7 @@
       </p:grpSpPr>
       <p:sp>
         <p:nvSpPr>
-          <p:cNvPr id="246" name="Shape 246"/>
+          <p:cNvPr id="248" name="Shape 248"/>
           <p:cNvSpPr/>
           <p:nvPr>
             <p:ph type="title"/>
@@ -6300,8 +6353,8 @@
         </p:nvSpPr>
         <p:spPr>
           <a:xfrm>
-            <a:off x="3581470" y="4295688"/>
-            <a:ext cx="6376971" cy="1794627"/>
+            <a:off x="406400" y="1536700"/>
+            <a:ext cx="12192000" cy="1169260"/>
           </a:xfrm>
           <a:prstGeom prst="rect">
             <a:avLst/>
@@ -6310,14 +6363,67 @@
         <p:txBody>
           <a:bodyPr/>
           <a:lstStyle>
-            <a:lvl1pPr defTabSz="455675">
-              <a:defRPr sz="13259"/>
+            <a:lvl1pPr defTabSz="403097">
+              <a:spcBef>
+                <a:spcPts val="1900"/>
+              </a:spcBef>
+              <a:defRPr sz="8280"/>
             </a:lvl1pPr>
           </a:lstStyle>
           <a:p>
             <a:pPr/>
             <a:r>
-              <a:t>Exercises</a:t>
+              <a:t>Group By</a:t>
+            </a:r>
+          </a:p>
+        </p:txBody>
+      </p:sp>
+      <p:sp>
+        <p:nvSpPr>
+          <p:cNvPr id="249" name="Shape 249"/>
+          <p:cNvSpPr/>
+          <p:nvPr>
+            <p:ph type="body" idx="1"/>
+          </p:nvPr>
+        </p:nvSpPr>
+        <p:spPr>
+          <a:xfrm>
+            <a:off x="406400" y="3953767"/>
+            <a:ext cx="12192000" cy="5471952"/>
+          </a:xfrm>
+          <a:prstGeom prst="rect">
+            <a:avLst/>
+          </a:prstGeom>
+        </p:spPr>
+        <p:txBody>
+          <a:bodyPr/>
+          <a:lstStyle/>
+          <a:p>
+            <a:pPr marL="705970" indent="-705970">
+              <a:buClrTx/>
+              <a:buSzPct val="40000"/>
+              <a:buFontTx/>
+              <a:buBlip>
+                <a:blip r:embed="rId2"/>
+              </a:buBlip>
+              <a:defRPr sz="6400"/>
+            </a:pPr>
+            <a:r>
+              <a:t>Generalized .value_counts()</a:t>
+            </a:r>
+          </a:p>
+          <a:p>
+            <a:pPr marL="705970" indent="-705970">
+              <a:buClrTx/>
+              <a:buSzPct val="40000"/>
+              <a:buFontTx/>
+              <a:buBlip>
+                <a:blip r:embed="rId2"/>
+              </a:buBlip>
+              <a:defRPr sz="6400"/>
+            </a:pPr>
+            <a:r>
+              <a:t>Still splits on unique values, but can aggregate many ways</a:t>
             </a:r>
           </a:p>
         </p:txBody>
@@ -6350,7 +6456,7 @@
       </p:grpSpPr>
       <p:sp>
         <p:nvSpPr>
-          <p:cNvPr id="248" name="Shape 248"/>
+          <p:cNvPr id="251" name="Shape 251"/>
           <p:cNvSpPr/>
           <p:nvPr>
             <p:ph type="title"/>
@@ -6358,8 +6464,8 @@
         </p:nvSpPr>
         <p:spPr>
           <a:xfrm>
-            <a:off x="3581470" y="4295688"/>
-            <a:ext cx="6376971" cy="1794627"/>
+            <a:off x="406400" y="1536700"/>
+            <a:ext cx="12192000" cy="1169260"/>
           </a:xfrm>
           <a:prstGeom prst="rect">
             <a:avLst/>
@@ -6368,14 +6474,63 @@
         <p:txBody>
           <a:bodyPr/>
           <a:lstStyle>
-            <a:lvl1pPr defTabSz="455675">
-              <a:defRPr sz="13259"/>
+            <a:lvl1pPr defTabSz="403097">
+              <a:spcBef>
+                <a:spcPts val="1900"/>
+              </a:spcBef>
+              <a:defRPr sz="8280"/>
             </a:lvl1pPr>
           </a:lstStyle>
           <a:p>
             <a:pPr/>
             <a:r>
-              <a:t>Grouping</a:t>
+              <a:t>Group By</a:t>
+            </a:r>
+          </a:p>
+        </p:txBody>
+      </p:sp>
+      <p:sp>
+        <p:nvSpPr>
+          <p:cNvPr id="252" name="Shape 252"/>
+          <p:cNvSpPr/>
+          <p:nvPr/>
+        </p:nvSpPr>
+        <p:spPr>
+          <a:xfrm>
+            <a:off x="1060958" y="4443479"/>
+            <a:ext cx="10882885" cy="2082801"/>
+          </a:xfrm>
+          <a:prstGeom prst="rect">
+            <a:avLst/>
+          </a:prstGeom>
+          <a:ln w="12700">
+            <a:miter lim="400000"/>
+          </a:ln>
+          <a:extLst>
+            <a:ext uri="{C572A759-6A51-4108-AA02-DFA0A04FC94B}">
+              <ma14:wrappingTextBoxFlag xmlns:ma14="http://schemas.microsoft.com/office/mac/drawingml/2011/main" val="1"/>
+            </a:ext>
+          </a:extLst>
+        </p:spPr>
+        <p:txBody>
+          <a:bodyPr wrap="none" lIns="50800" tIns="50800" rIns="50800" bIns="50800" anchor="ctr">
+            <a:spAutoFit/>
+          </a:bodyPr>
+          <a:lstStyle/>
+          <a:p>
+            <a:pPr>
+              <a:defRPr sz="4800"/>
+            </a:pPr>
+            <a:r>
+              <a:t>SELECT  STATE, COUNT(*)</a:t>
+            </a:r>
+          </a:p>
+          <a:p>
+            <a:pPr>
+              <a:defRPr sz="4800"/>
+            </a:pPr>
+            <a:r>
+              <a:t>FROM PURCHASES GROUP BY STATE </a:t>
             </a:r>
           </a:p>
         </p:txBody>
@@ -6392,6 +6547,11 @@
 <file path=ppt/slides/slide17.xml><?xml version="1.0" encoding="utf-8"?>
 <p:sld xmlns:a="http://schemas.openxmlformats.org/drawingml/2006/main" xmlns:r="http://schemas.openxmlformats.org/officeDocument/2006/relationships" xmlns:p="http://schemas.openxmlformats.org/presentationml/2006/main" showMasterSp="1" showMasterPhAnim="1">
   <p:cSld>
+    <p:bg>
+      <p:bgPr>
+        <a:noFill/>
+      </p:bgPr>
+    </p:bg>
     <p:spTree>
       <p:nvGrpSpPr>
         <p:cNvPr id="1" name=""/>
@@ -6406,51 +6566,26 @@
           <a:chExt cx="0" cy="0"/>
         </a:xfrm>
       </p:grpSpPr>
-      <p:sp>
-        <p:nvSpPr>
-          <p:cNvPr id="250" name="Shape 250"/>
-          <p:cNvSpPr/>
-          <p:nvPr>
-            <p:ph type="title"/>
-          </p:nvPr>
-        </p:nvSpPr>
+      <p:pic>
+        <p:nvPicPr>
+          <p:cNvPr id="254" name="pasted-image.tiff"/>
+          <p:cNvPicPr>
+            <a:picLocks noChangeAspect="1"/>
+          </p:cNvPicPr>
+          <p:nvPr/>
+        </p:nvPicPr>
+        <p:blipFill>
+          <a:blip r:embed="rId2">
+            <a:extLst/>
+          </a:blip>
+          <a:stretch>
+            <a:fillRect/>
+          </a:stretch>
+        </p:blipFill>
         <p:spPr>
           <a:xfrm>
-            <a:off x="406400" y="1536700"/>
-            <a:ext cx="12192000" cy="1169260"/>
-          </a:xfrm>
-          <a:prstGeom prst="rect">
-            <a:avLst/>
-          </a:prstGeom>
-        </p:spPr>
-        <p:txBody>
-          <a:bodyPr/>
-          <a:lstStyle>
-            <a:lvl1pPr defTabSz="403097">
-              <a:spcBef>
-                <a:spcPts val="1900"/>
-              </a:spcBef>
-              <a:defRPr sz="8280"/>
-            </a:lvl1pPr>
-          </a:lstStyle>
-          <a:p>
-            <a:pPr/>
-            <a:r>
-              <a:t>Counting Unique values</a:t>
-            </a:r>
-          </a:p>
-        </p:txBody>
-      </p:sp>
-      <p:sp>
-        <p:nvSpPr>
-          <p:cNvPr id="251" name="Shape 251"/>
-          <p:cNvSpPr/>
-          <p:nvPr/>
-        </p:nvSpPr>
-        <p:spPr>
-          <a:xfrm>
-            <a:off x="227675" y="4369987"/>
-            <a:ext cx="12549449" cy="1955801"/>
+            <a:off x="-17945" y="5541"/>
+            <a:ext cx="13040690" cy="9780518"/>
           </a:xfrm>
           <a:prstGeom prst="rect">
             <a:avLst/>
@@ -6458,45 +6593,8 @@
           <a:ln w="12700">
             <a:miter lim="400000"/>
           </a:ln>
-          <a:extLst>
-            <a:ext uri="{C572A759-6A51-4108-AA02-DFA0A04FC94B}">
-              <ma14:wrappingTextBoxFlag xmlns:ma14="http://schemas.microsoft.com/office/mac/drawingml/2011/main" val="1"/>
-            </a:ext>
-          </a:extLst>
-        </p:spPr>
-        <p:txBody>
-          <a:bodyPr lIns="50800" tIns="50800" rIns="50800" bIns="50800" anchor="ctr">
-            <a:spAutoFit/>
-          </a:bodyPr>
-          <a:lstStyle/>
-          <a:p>
-            <a:pPr>
-              <a:defRPr sz="5100">
-                <a:latin typeface="Anonymous Pro for Powerline"/>
-                <a:ea typeface="Anonymous Pro for Powerline"/>
-                <a:cs typeface="Anonymous Pro for Powerline"/>
-                <a:sym typeface="Anonymous Pro for Powerline"/>
-              </a:defRPr>
-            </a:pPr>
-            <a:r>
-              <a:t>df[‘first_name’].value_counts()</a:t>
-            </a:r>
-          </a:p>
-          <a:p>
-            <a:pPr>
-              <a:defRPr sz="5100">
-                <a:latin typeface="Anonymous Pro for Powerline"/>
-                <a:ea typeface="Anonymous Pro for Powerline"/>
-                <a:cs typeface="Anonymous Pro for Powerline"/>
-                <a:sym typeface="Anonymous Pro for Powerline"/>
-              </a:defRPr>
-            </a:pPr>
-            <a:r>
-              <a:t> </a:t>
-            </a:r>
-          </a:p>
-        </p:txBody>
-      </p:sp>
+        </p:spPr>
+      </p:pic>
     </p:spTree>
   </p:cSld>
   <p:clrMapOvr>
@@ -6525,7 +6623,7 @@
       </p:grpSpPr>
       <p:sp>
         <p:nvSpPr>
-          <p:cNvPr id="253" name="Shape 253"/>
+          <p:cNvPr id="256" name="Shape 256"/>
           <p:cNvSpPr/>
           <p:nvPr>
             <p:ph type="title"/>
@@ -6553,21 +6651,21 @@
           <a:p>
             <a:pPr/>
             <a:r>
-              <a:t>Counting Unique values</a:t>
-            </a:r>
-          </a:p>
-        </p:txBody>
-      </p:sp>
-      <p:sp>
-        <p:nvSpPr>
-          <p:cNvPr id="254" name="Shape 254"/>
+              <a:t>GRoupBY</a:t>
+            </a:r>
+          </a:p>
+        </p:txBody>
+      </p:sp>
+      <p:sp>
+        <p:nvSpPr>
+          <p:cNvPr id="257" name="Shape 257"/>
           <p:cNvSpPr/>
           <p:nvPr/>
         </p:nvSpPr>
         <p:spPr>
           <a:xfrm>
-            <a:off x="227675" y="4369987"/>
-            <a:ext cx="12549449" cy="1955801"/>
+            <a:off x="510396" y="4438650"/>
+            <a:ext cx="12192002" cy="876301"/>
           </a:xfrm>
           <a:prstGeom prst="rect">
             <a:avLst/>
@@ -6585,44 +6683,33 @@
           <a:bodyPr lIns="50800" tIns="50800" rIns="50800" bIns="50800" anchor="ctr">
             <a:spAutoFit/>
           </a:bodyPr>
-          <a:lstStyle/>
-          <a:p>
-            <a:pPr>
+          <a:lstStyle>
+            <a:lvl1pPr>
               <a:defRPr sz="5100">
                 <a:latin typeface="Anonymous Pro for Powerline"/>
                 <a:ea typeface="Anonymous Pro for Powerline"/>
                 <a:cs typeface="Anonymous Pro for Powerline"/>
                 <a:sym typeface="Anonymous Pro for Powerline"/>
               </a:defRPr>
-            </a:pPr>
-            <a:r>
-              <a:t>df[‘first_name’].value_counts()</a:t>
-            </a:r>
-          </a:p>
-          <a:p>
-            <a:pPr>
-              <a:defRPr sz="5100">
-                <a:latin typeface="Anonymous Pro for Powerline"/>
-                <a:ea typeface="Anonymous Pro for Powerline"/>
-                <a:cs typeface="Anonymous Pro for Powerline"/>
-                <a:sym typeface="Anonymous Pro for Powerline"/>
-              </a:defRPr>
-            </a:pPr>
-            <a:r>
-              <a:t> </a:t>
-            </a:r>
-          </a:p>
-        </p:txBody>
-      </p:sp>
-      <p:sp>
-        <p:nvSpPr>
-          <p:cNvPr id="255" name="Shape 255"/>
+            </a:lvl1pPr>
+          </a:lstStyle>
+          <a:p>
+            <a:pPr/>
+            <a:r>
+              <a:t>df.groupby(“first_name”)</a:t>
+            </a:r>
+          </a:p>
+        </p:txBody>
+      </p:sp>
+      <p:sp>
+        <p:nvSpPr>
+          <p:cNvPr id="258" name="Shape 258"/>
           <p:cNvSpPr/>
           <p:nvPr/>
         </p:nvSpPr>
         <p:spPr>
-          <a:xfrm rot="21591301">
-            <a:off x="458640" y="6227488"/>
+          <a:xfrm rot="16200000">
+            <a:off x="5692008" y="5989189"/>
             <a:ext cx="1620784" cy="518251"/>
           </a:xfrm>
           <a:prstGeom prst="rightArrow">
@@ -6664,14 +6751,14 @@
       </p:sp>
       <p:sp>
         <p:nvSpPr>
-          <p:cNvPr id="256" name="Shape 256"/>
+          <p:cNvPr id="259" name="Shape 259"/>
           <p:cNvSpPr/>
           <p:nvPr/>
         </p:nvSpPr>
         <p:spPr>
           <a:xfrm>
-            <a:off x="2278932" y="5914977"/>
-            <a:ext cx="4181857" cy="1143001"/>
+            <a:off x="2879351" y="7359017"/>
+            <a:ext cx="8178547" cy="1143001"/>
           </a:xfrm>
           <a:prstGeom prst="rect">
             <a:avLst/>
@@ -6701,95 +6788,7 @@
           <a:p>
             <a:pPr/>
             <a:r>
-              <a:t>“John”: 352</a:t>
-            </a:r>
-          </a:p>
-        </p:txBody>
-      </p:sp>
-      <p:sp>
-        <p:nvSpPr>
-          <p:cNvPr id="257" name="Shape 257"/>
-          <p:cNvSpPr/>
-          <p:nvPr/>
-        </p:nvSpPr>
-        <p:spPr>
-          <a:xfrm>
-            <a:off x="2278932" y="7156344"/>
-            <a:ext cx="4338829" cy="1143001"/>
-          </a:xfrm>
-          <a:prstGeom prst="rect">
-            <a:avLst/>
-          </a:prstGeom>
-          <a:ln w="12700">
-            <a:miter lim="400000"/>
-          </a:ln>
-          <a:extLst>
-            <a:ext uri="{C572A759-6A51-4108-AA02-DFA0A04FC94B}">
-              <ma14:wrappingTextBoxFlag xmlns:ma14="http://schemas.microsoft.com/office/mac/drawingml/2011/main" val="1"/>
-            </a:ext>
-          </a:extLst>
-        </p:spPr>
-        <p:txBody>
-          <a:bodyPr wrap="none" lIns="50800" tIns="50800" rIns="50800" bIns="50800" anchor="ctr">
-            <a:spAutoFit/>
-          </a:bodyPr>
-          <a:lstStyle>
-            <a:lvl1pPr>
-              <a:defRPr sz="6000">
-                <a:solidFill>
-                  <a:schemeClr val="accent5"/>
-                </a:solidFill>
-              </a:defRPr>
-            </a:lvl1pPr>
-          </a:lstStyle>
-          <a:p>
-            <a:pPr/>
-            <a:r>
-              <a:t>“Chris”: 280</a:t>
-            </a:r>
-          </a:p>
-        </p:txBody>
-      </p:sp>
-      <p:sp>
-        <p:nvSpPr>
-          <p:cNvPr id="258" name="Shape 258"/>
-          <p:cNvSpPr/>
-          <p:nvPr/>
-        </p:nvSpPr>
-        <p:spPr>
-          <a:xfrm>
-            <a:off x="2419522" y="8397712"/>
-            <a:ext cx="4057651" cy="1143001"/>
-          </a:xfrm>
-          <a:prstGeom prst="rect">
-            <a:avLst/>
-          </a:prstGeom>
-          <a:ln w="12700">
-            <a:miter lim="400000"/>
-          </a:ln>
-          <a:extLst>
-            <a:ext uri="{C572A759-6A51-4108-AA02-DFA0A04FC94B}">
-              <ma14:wrappingTextBoxFlag xmlns:ma14="http://schemas.microsoft.com/office/mac/drawingml/2011/main" val="1"/>
-            </a:ext>
-          </a:extLst>
-        </p:spPr>
-        <p:txBody>
-          <a:bodyPr wrap="none" lIns="50800" tIns="50800" rIns="50800" bIns="50800" anchor="ctr">
-            <a:spAutoFit/>
-          </a:bodyPr>
-          <a:lstStyle>
-            <a:lvl1pPr>
-              <a:defRPr sz="6000">
-                <a:solidFill>
-                  <a:schemeClr val="accent5"/>
-                </a:solidFill>
-              </a:defRPr>
-            </a:lvl1pPr>
-          </a:lstStyle>
-          <a:p>
-            <a:pPr/>
-            <a:r>
-              <a:t>“Tom”: 264</a:t>
+              <a:t>same value? combined</a:t>
             </a:r>
           </a:p>
         </p:txBody>
@@ -6820,26 +6819,51 @@
           <a:chExt cx="0" cy="0"/>
         </a:xfrm>
       </p:grpSpPr>
-      <p:pic>
-        <p:nvPicPr>
-          <p:cNvPr id="260" name="pasted-image.tiff"/>
-          <p:cNvPicPr>
-            <a:picLocks noChangeAspect="1"/>
-          </p:cNvPicPr>
+      <p:sp>
+        <p:nvSpPr>
+          <p:cNvPr id="261" name="Shape 261"/>
+          <p:cNvSpPr/>
+          <p:nvPr>
+            <p:ph type="title"/>
+          </p:nvPr>
+        </p:nvSpPr>
+        <p:spPr>
+          <a:xfrm>
+            <a:off x="406400" y="1536700"/>
+            <a:ext cx="12192000" cy="1169260"/>
+          </a:xfrm>
+          <a:prstGeom prst="rect">
+            <a:avLst/>
+          </a:prstGeom>
+        </p:spPr>
+        <p:txBody>
+          <a:bodyPr/>
+          <a:lstStyle>
+            <a:lvl1pPr defTabSz="403097">
+              <a:spcBef>
+                <a:spcPts val="1900"/>
+              </a:spcBef>
+              <a:defRPr sz="8280"/>
+            </a:lvl1pPr>
+          </a:lstStyle>
+          <a:p>
+            <a:pPr/>
+            <a:r>
+              <a:t>GRoupBY</a:t>
+            </a:r>
+          </a:p>
+        </p:txBody>
+      </p:sp>
+      <p:sp>
+        <p:nvSpPr>
+          <p:cNvPr id="262" name="Shape 262"/>
+          <p:cNvSpPr/>
           <p:nvPr/>
-        </p:nvPicPr>
-        <p:blipFill>
-          <a:blip r:embed="rId2">
-            <a:extLst/>
-          </a:blip>
-          <a:stretch>
-            <a:fillRect/>
-          </a:stretch>
-        </p:blipFill>
+        </p:nvSpPr>
         <p:spPr>
           <a:xfrm>
-            <a:off x="1806" y="-3794365"/>
-            <a:ext cx="13001188" cy="13566459"/>
+            <a:off x="510396" y="4438650"/>
+            <a:ext cx="12946701" cy="876301"/>
           </a:xfrm>
           <a:prstGeom prst="rect">
             <a:avLst/>
@@ -6847,8 +6871,34 @@
           <a:ln w="12700">
             <a:miter lim="400000"/>
           </a:ln>
-        </p:spPr>
-      </p:pic>
+          <a:extLst>
+            <a:ext uri="{C572A759-6A51-4108-AA02-DFA0A04FC94B}">
+              <ma14:wrappingTextBoxFlag xmlns:ma14="http://schemas.microsoft.com/office/mac/drawingml/2011/main" val="1"/>
+            </a:ext>
+          </a:extLst>
+        </p:spPr>
+        <p:txBody>
+          <a:bodyPr lIns="50800" tIns="50800" rIns="50800" bIns="50800" anchor="ctr">
+            <a:spAutoFit/>
+          </a:bodyPr>
+          <a:lstStyle>
+            <a:lvl1pPr>
+              <a:defRPr sz="5100">
+                <a:latin typeface="Anonymous Pro for Powerline"/>
+                <a:ea typeface="Anonymous Pro for Powerline"/>
+                <a:cs typeface="Anonymous Pro for Powerline"/>
+                <a:sym typeface="Anonymous Pro for Powerline"/>
+              </a:defRPr>
+            </a:lvl1pPr>
+          </a:lstStyle>
+          <a:p>
+            <a:pPr/>
+            <a:r>
+              <a:t>df.groupby(“first_name”).sum()</a:t>
+            </a:r>
+          </a:p>
+        </p:txBody>
+      </p:sp>
     </p:spTree>
   </p:cSld>
   <p:clrMapOvr>
@@ -6935,7 +6985,7 @@
       </p:grpSpPr>
       <p:sp>
         <p:nvSpPr>
-          <p:cNvPr id="262" name="Shape 262"/>
+          <p:cNvPr id="264" name="Shape 264"/>
           <p:cNvSpPr/>
           <p:nvPr>
             <p:ph type="title"/>
@@ -6963,66 +7013,144 @@
           <a:p>
             <a:pPr/>
             <a:r>
-              <a:t>Group By</a:t>
-            </a:r>
-          </a:p>
-        </p:txBody>
-      </p:sp>
-      <p:sp>
-        <p:nvSpPr>
-          <p:cNvPr id="263" name="Shape 263"/>
-          <p:cNvSpPr/>
-          <p:nvPr>
-            <p:ph type="body" sz="half" idx="1"/>
-          </p:nvPr>
+              <a:t>GRoupBY</a:t>
+            </a:r>
+          </a:p>
+        </p:txBody>
+      </p:sp>
+      <p:sp>
+        <p:nvSpPr>
+          <p:cNvPr id="265" name="Shape 265"/>
+          <p:cNvSpPr/>
+          <p:nvPr/>
         </p:nvSpPr>
         <p:spPr>
           <a:xfrm>
-            <a:off x="406400" y="3953767"/>
-            <a:ext cx="12192000" cy="2531601"/>
+            <a:off x="510396" y="4438650"/>
+            <a:ext cx="12946701" cy="876301"/>
           </a:xfrm>
           <a:prstGeom prst="rect">
             <a:avLst/>
           </a:prstGeom>
-        </p:spPr>
-        <p:txBody>
-          <a:bodyPr/>
+          <a:ln w="12700">
+            <a:miter lim="400000"/>
+          </a:ln>
+          <a:extLst>
+            <a:ext uri="{C572A759-6A51-4108-AA02-DFA0A04FC94B}">
+              <ma14:wrappingTextBoxFlag xmlns:ma14="http://schemas.microsoft.com/office/mac/drawingml/2011/main" val="1"/>
+            </a:ext>
+          </a:extLst>
+        </p:spPr>
+        <p:txBody>
+          <a:bodyPr lIns="50800" tIns="50800" rIns="50800" bIns="50800" anchor="ctr">
+            <a:spAutoFit/>
+          </a:bodyPr>
+          <a:lstStyle>
+            <a:lvl1pPr>
+              <a:defRPr sz="5100">
+                <a:latin typeface="Anonymous Pro for Powerline"/>
+                <a:ea typeface="Anonymous Pro for Powerline"/>
+                <a:cs typeface="Anonymous Pro for Powerline"/>
+                <a:sym typeface="Anonymous Pro for Powerline"/>
+              </a:defRPr>
+            </a:lvl1pPr>
+          </a:lstStyle>
+          <a:p>
+            <a:pPr/>
+            <a:r>
+              <a:t>df.groupby(“first_name”).sum()</a:t>
+            </a:r>
+          </a:p>
+        </p:txBody>
+      </p:sp>
+      <p:sp>
+        <p:nvSpPr>
+          <p:cNvPr id="266" name="Shape 266"/>
+          <p:cNvSpPr/>
+          <p:nvPr/>
+        </p:nvSpPr>
+        <p:spPr>
+          <a:xfrm rot="16200000">
+            <a:off x="9249547" y="6141193"/>
+            <a:ext cx="1620784" cy="518251"/>
+          </a:xfrm>
+          <a:prstGeom prst="rightArrow">
+            <a:avLst>
+              <a:gd name="adj1" fmla="val 34174"/>
+              <a:gd name="adj2" fmla="val 145948"/>
+            </a:avLst>
+          </a:prstGeom>
+          <a:solidFill>
+            <a:schemeClr val="accent5"/>
+          </a:solidFill>
+          <a:ln w="12700">
+            <a:miter lim="400000"/>
+          </a:ln>
+        </p:spPr>
+        <p:txBody>
+          <a:bodyPr lIns="50800" tIns="50800" rIns="50800" bIns="50800" anchor="ctr"/>
           <a:lstStyle/>
           <a:p>
-            <a:pPr marL="663612" indent="-663612" defTabSz="549148">
-              <a:spcBef>
-                <a:spcPts val="2600"/>
-              </a:spcBef>
-              <a:buClrTx/>
-              <a:buSzPct val="40000"/>
-              <a:buFontTx/>
-              <a:buBlip>
-                <a:blip r:embed="rId2"/>
-              </a:buBlip>
-              <a:defRPr sz="6016"/>
-            </a:pPr>
-            <a:r>
-              <a:t>Generalized .value_counts()</a:t>
-            </a:r>
-          </a:p>
-          <a:p>
-            <a:pPr marL="663612" indent="-663612" defTabSz="549148">
+            <a:pPr algn="ctr">
               <a:lnSpc>
-                <a:spcPct val="200000"/>
+                <a:spcPct val="80000"/>
               </a:lnSpc>
               <a:spcBef>
-                <a:spcPts val="2600"/>
+                <a:spcPts val="0"/>
               </a:spcBef>
-              <a:buClrTx/>
-              <a:buSzPct val="40000"/>
-              <a:buFontTx/>
-              <a:buBlip>
-                <a:blip r:embed="rId2"/>
-              </a:buBlip>
-              <a:defRPr sz="6016"/>
+              <a:defRPr cap="all" sz="2800">
+                <a:solidFill>
+                  <a:srgbClr val="FFFFFF"/>
+                </a:solidFill>
+                <a:latin typeface="+mn-lt"/>
+                <a:ea typeface="+mn-ea"/>
+                <a:cs typeface="+mn-cs"/>
+                <a:sym typeface="DIN Condensed"/>
+              </a:defRPr>
             </a:pPr>
-            <a:r>
-              <a:t>Combines rows using a ufunc </a:t>
+          </a:p>
+        </p:txBody>
+      </p:sp>
+      <p:sp>
+        <p:nvSpPr>
+          <p:cNvPr id="267" name="Shape 267"/>
+          <p:cNvSpPr/>
+          <p:nvPr/>
+        </p:nvSpPr>
+        <p:spPr>
+          <a:xfrm>
+            <a:off x="420116" y="7485686"/>
+            <a:ext cx="12164569" cy="1143001"/>
+          </a:xfrm>
+          <a:prstGeom prst="rect">
+            <a:avLst/>
+          </a:prstGeom>
+          <a:ln w="12700">
+            <a:miter lim="400000"/>
+          </a:ln>
+          <a:extLst>
+            <a:ext uri="{C572A759-6A51-4108-AA02-DFA0A04FC94B}">
+              <ma14:wrappingTextBoxFlag xmlns:ma14="http://schemas.microsoft.com/office/mac/drawingml/2011/main" val="1"/>
+            </a:ext>
+          </a:extLst>
+        </p:spPr>
+        <p:txBody>
+          <a:bodyPr wrap="none" lIns="50800" tIns="50800" rIns="50800" bIns="50800" anchor="ctr">
+            <a:spAutoFit/>
+          </a:bodyPr>
+          <a:lstStyle>
+            <a:lvl1pPr>
+              <a:defRPr sz="6000">
+                <a:solidFill>
+                  <a:schemeClr val="accent5"/>
+                </a:solidFill>
+              </a:defRPr>
+            </a:lvl1pPr>
+          </a:lstStyle>
+          <a:p>
+            <a:pPr/>
+            <a:r>
+              <a:t>How other columns are combined </a:t>
             </a:r>
           </a:p>
         </p:txBody>
@@ -7039,11 +7167,6 @@
 <file path=ppt/slides/slide21.xml><?xml version="1.0" encoding="utf-8"?>
 <p:sld xmlns:a="http://schemas.openxmlformats.org/drawingml/2006/main" xmlns:r="http://schemas.openxmlformats.org/officeDocument/2006/relationships" xmlns:p="http://schemas.openxmlformats.org/presentationml/2006/main" showMasterSp="1" showMasterPhAnim="1">
   <p:cSld>
-    <p:bg>
-      <p:bgPr>
-        <a:noFill/>
-      </p:bgPr>
-    </p:bg>
     <p:spTree>
       <p:nvGrpSpPr>
         <p:cNvPr id="1" name=""/>
@@ -7058,35 +7181,38 @@
           <a:chExt cx="0" cy="0"/>
         </a:xfrm>
       </p:grpSpPr>
-      <p:pic>
-        <p:nvPicPr>
-          <p:cNvPr id="265" name="pasted-image.tiff"/>
-          <p:cNvPicPr>
-            <a:picLocks noChangeAspect="1"/>
-          </p:cNvPicPr>
-          <p:nvPr/>
-        </p:nvPicPr>
-        <p:blipFill>
-          <a:blip r:embed="rId2">
-            <a:extLst/>
-          </a:blip>
-          <a:stretch>
-            <a:fillRect/>
-          </a:stretch>
-        </p:blipFill>
+      <p:sp>
+        <p:nvSpPr>
+          <p:cNvPr id="269" name="Shape 269"/>
+          <p:cNvSpPr/>
+          <p:nvPr>
+            <p:ph type="title"/>
+          </p:nvPr>
+        </p:nvSpPr>
         <p:spPr>
           <a:xfrm>
-            <a:off x="-17945" y="5541"/>
-            <a:ext cx="13040690" cy="9780518"/>
+            <a:off x="3279937" y="4128458"/>
+            <a:ext cx="6444926" cy="1982356"/>
           </a:xfrm>
           <a:prstGeom prst="rect">
             <a:avLst/>
           </a:prstGeom>
-          <a:ln w="12700">
-            <a:miter lim="400000"/>
-          </a:ln>
-        </p:spPr>
-      </p:pic>
+        </p:spPr>
+        <p:txBody>
+          <a:bodyPr/>
+          <a:lstStyle>
+            <a:lvl1pPr defTabSz="502412">
+              <a:defRPr sz="14620"/>
+            </a:lvl1pPr>
+          </a:lstStyle>
+          <a:p>
+            <a:pPr/>
+            <a:r>
+              <a:t>Exercises</a:t>
+            </a:r>
+          </a:p>
+        </p:txBody>
+      </p:sp>
     </p:spTree>
   </p:cSld>
   <p:clrMapOvr>
@@ -7115,7 +7241,7 @@
       </p:grpSpPr>
       <p:sp>
         <p:nvSpPr>
-          <p:cNvPr id="267" name="Shape 267"/>
+          <p:cNvPr id="271" name="Shape 271"/>
           <p:cNvSpPr/>
           <p:nvPr>
             <p:ph type="title"/>
@@ -7123,8 +7249,8 @@
         </p:nvSpPr>
         <p:spPr>
           <a:xfrm>
-            <a:off x="406400" y="1536700"/>
-            <a:ext cx="12192000" cy="1169260"/>
+            <a:off x="2595467" y="4055489"/>
+            <a:ext cx="7813866" cy="1982355"/>
           </a:xfrm>
           <a:prstGeom prst="rect">
             <a:avLst/>
@@ -7133,154 +7259,14 @@
         <p:txBody>
           <a:bodyPr/>
           <a:lstStyle>
-            <a:lvl1pPr defTabSz="403097">
-              <a:spcBef>
-                <a:spcPts val="1900"/>
-              </a:spcBef>
-              <a:defRPr sz="8280"/>
+            <a:lvl1pPr defTabSz="490727">
+              <a:defRPr sz="14280"/>
             </a:lvl1pPr>
           </a:lstStyle>
           <a:p>
             <a:pPr/>
             <a:r>
-              <a:t>GRoupBY</a:t>
-            </a:r>
-          </a:p>
-        </p:txBody>
-      </p:sp>
-      <p:sp>
-        <p:nvSpPr>
-          <p:cNvPr id="268" name="Shape 268"/>
-          <p:cNvSpPr/>
-          <p:nvPr/>
-        </p:nvSpPr>
-        <p:spPr>
-          <a:xfrm>
-            <a:off x="510396" y="4438650"/>
-            <a:ext cx="12192002" cy="876301"/>
-          </a:xfrm>
-          <a:prstGeom prst="rect">
-            <a:avLst/>
-          </a:prstGeom>
-          <a:ln w="12700">
-            <a:miter lim="400000"/>
-          </a:ln>
-          <a:extLst>
-            <a:ext uri="{C572A759-6A51-4108-AA02-DFA0A04FC94B}">
-              <ma14:wrappingTextBoxFlag xmlns:ma14="http://schemas.microsoft.com/office/mac/drawingml/2011/main" val="1"/>
-            </a:ext>
-          </a:extLst>
-        </p:spPr>
-        <p:txBody>
-          <a:bodyPr lIns="50800" tIns="50800" rIns="50800" bIns="50800" anchor="ctr">
-            <a:spAutoFit/>
-          </a:bodyPr>
-          <a:lstStyle>
-            <a:lvl1pPr>
-              <a:defRPr sz="5100">
-                <a:latin typeface="Anonymous Pro for Powerline"/>
-                <a:ea typeface="Anonymous Pro for Powerline"/>
-                <a:cs typeface="Anonymous Pro for Powerline"/>
-                <a:sym typeface="Anonymous Pro for Powerline"/>
-              </a:defRPr>
-            </a:lvl1pPr>
-          </a:lstStyle>
-          <a:p>
-            <a:pPr/>
-            <a:r>
-              <a:t>df.groupby(“first_name”)</a:t>
-            </a:r>
-          </a:p>
-        </p:txBody>
-      </p:sp>
-      <p:sp>
-        <p:nvSpPr>
-          <p:cNvPr id="269" name="Shape 269"/>
-          <p:cNvSpPr/>
-          <p:nvPr/>
-        </p:nvSpPr>
-        <p:spPr>
-          <a:xfrm rot="16200000">
-            <a:off x="5692008" y="5989189"/>
-            <a:ext cx="1620784" cy="518251"/>
-          </a:xfrm>
-          <a:prstGeom prst="rightArrow">
-            <a:avLst>
-              <a:gd name="adj1" fmla="val 34174"/>
-              <a:gd name="adj2" fmla="val 145948"/>
-            </a:avLst>
-          </a:prstGeom>
-          <a:solidFill>
-            <a:schemeClr val="accent5"/>
-          </a:solidFill>
-          <a:ln w="12700">
-            <a:miter lim="400000"/>
-          </a:ln>
-        </p:spPr>
-        <p:txBody>
-          <a:bodyPr lIns="50800" tIns="50800" rIns="50800" bIns="50800" anchor="ctr"/>
-          <a:lstStyle/>
-          <a:p>
-            <a:pPr algn="ctr">
-              <a:lnSpc>
-                <a:spcPct val="80000"/>
-              </a:lnSpc>
-              <a:spcBef>
-                <a:spcPts val="0"/>
-              </a:spcBef>
-              <a:defRPr cap="all" sz="2800">
-                <a:solidFill>
-                  <a:srgbClr val="FFFFFF"/>
-                </a:solidFill>
-                <a:latin typeface="+mn-lt"/>
-                <a:ea typeface="+mn-ea"/>
-                <a:cs typeface="+mn-cs"/>
-                <a:sym typeface="DIN Condensed"/>
-              </a:defRPr>
-            </a:pPr>
-          </a:p>
-        </p:txBody>
-      </p:sp>
-      <p:sp>
-        <p:nvSpPr>
-          <p:cNvPr id="270" name="Shape 270"/>
-          <p:cNvSpPr/>
-          <p:nvPr/>
-        </p:nvSpPr>
-        <p:spPr>
-          <a:xfrm>
-            <a:off x="2879351" y="7359017"/>
-            <a:ext cx="8178547" cy="1143001"/>
-          </a:xfrm>
-          <a:prstGeom prst="rect">
-            <a:avLst/>
-          </a:prstGeom>
-          <a:ln w="12700">
-            <a:miter lim="400000"/>
-          </a:ln>
-          <a:extLst>
-            <a:ext uri="{C572A759-6A51-4108-AA02-DFA0A04FC94B}">
-              <ma14:wrappingTextBoxFlag xmlns:ma14="http://schemas.microsoft.com/office/mac/drawingml/2011/main" val="1"/>
-            </a:ext>
-          </a:extLst>
-        </p:spPr>
-        <p:txBody>
-          <a:bodyPr wrap="none" lIns="50800" tIns="50800" rIns="50800" bIns="50800" anchor="ctr">
-            <a:spAutoFit/>
-          </a:bodyPr>
-          <a:lstStyle>
-            <a:lvl1pPr>
-              <a:defRPr sz="6000">
-                <a:solidFill>
-                  <a:schemeClr val="accent5"/>
-                </a:solidFill>
-              </a:defRPr>
-            </a:lvl1pPr>
-          </a:lstStyle>
-          <a:p>
-            <a:pPr/>
-            <a:r>
-              <a:t>same value? combined</a:t>
+              <a:t>Pivot Tables</a:t>
             </a:r>
           </a:p>
         </p:txBody>
@@ -7313,7 +7299,7 @@
       </p:grpSpPr>
       <p:sp>
         <p:nvSpPr>
-          <p:cNvPr id="272" name="Shape 272"/>
+          <p:cNvPr id="273" name="Shape 273"/>
           <p:cNvSpPr/>
           <p:nvPr>
             <p:ph type="title"/>
@@ -7322,7 +7308,7 @@
         <p:spPr>
           <a:xfrm>
             <a:off x="406400" y="1536700"/>
-            <a:ext cx="12192000" cy="1169260"/>
+            <a:ext cx="12192000" cy="1169261"/>
           </a:xfrm>
           <a:prstGeom prst="rect">
             <a:avLst/>
@@ -7335,58 +7321,84 @@
               <a:spcBef>
                 <a:spcPts val="1900"/>
               </a:spcBef>
-              <a:defRPr sz="8280"/>
+              <a:defRPr sz="8200"/>
             </a:lvl1pPr>
           </a:lstStyle>
           <a:p>
             <a:pPr/>
             <a:r>
-              <a:t>GRoupBY</a:t>
-            </a:r>
-          </a:p>
-        </p:txBody>
-      </p:sp>
-      <p:sp>
-        <p:nvSpPr>
-          <p:cNvPr id="273" name="Shape 273"/>
-          <p:cNvSpPr/>
-          <p:nvPr/>
+              <a:t>Pivot table</a:t>
+            </a:r>
+          </a:p>
+        </p:txBody>
+      </p:sp>
+      <p:sp>
+        <p:nvSpPr>
+          <p:cNvPr id="274" name="Shape 274"/>
+          <p:cNvSpPr/>
+          <p:nvPr>
+            <p:ph type="body" sz="half" idx="1"/>
+          </p:nvPr>
         </p:nvSpPr>
         <p:spPr>
           <a:xfrm>
-            <a:off x="510396" y="4438650"/>
-            <a:ext cx="12946701" cy="876301"/>
+            <a:off x="406400" y="3953767"/>
+            <a:ext cx="12192000" cy="2531602"/>
           </a:xfrm>
           <a:prstGeom prst="rect">
             <a:avLst/>
           </a:prstGeom>
-          <a:ln w="12700">
-            <a:miter lim="400000"/>
-          </a:ln>
-          <a:extLst>
-            <a:ext uri="{C572A759-6A51-4108-AA02-DFA0A04FC94B}">
-              <ma14:wrappingTextBoxFlag xmlns:ma14="http://schemas.microsoft.com/office/mac/drawingml/2011/main" val="1"/>
-            </a:ext>
-          </a:extLst>
-        </p:spPr>
-        <p:txBody>
-          <a:bodyPr lIns="50800" tIns="50800" rIns="50800" bIns="50800" anchor="ctr">
-            <a:spAutoFit/>
-          </a:bodyPr>
-          <a:lstStyle>
-            <a:lvl1pPr>
-              <a:defRPr sz="5100">
-                <a:latin typeface="Anonymous Pro for Powerline"/>
-                <a:ea typeface="Anonymous Pro for Powerline"/>
-                <a:cs typeface="Anonymous Pro for Powerline"/>
-                <a:sym typeface="Anonymous Pro for Powerline"/>
-              </a:defRPr>
-            </a:lvl1pPr>
-          </a:lstStyle>
-          <a:p>
-            <a:pPr/>
-            <a:r>
-              <a:t>df.groupby(“first_name”).sum()</a:t>
+        </p:spPr>
+        <p:txBody>
+          <a:bodyPr anchor="t"/>
+          <a:lstStyle/>
+          <a:p>
+            <a:pPr marL="614194" indent="-614194" defTabSz="508254">
+              <a:lnSpc>
+                <a:spcPct val="100000"/>
+              </a:lnSpc>
+              <a:spcBef>
+                <a:spcPts val="2400"/>
+              </a:spcBef>
+              <a:buSzPct val="40000"/>
+              <a:buBlip>
+                <a:blip r:embed="rId2"/>
+              </a:buBlip>
+              <a:defRPr cap="none" spc="0" sz="5500">
+                <a:latin typeface="Avenir Next Medium"/>
+                <a:ea typeface="Avenir Next Medium"/>
+                <a:cs typeface="Avenir Next Medium"/>
+                <a:sym typeface="Avenir Next Medium"/>
+              </a:defRPr>
+            </a:pPr>
+            <a:r>
+              <a:t>Similar to groupby</a:t>
+            </a:r>
+          </a:p>
+          <a:p>
+            <a:pPr marL="614194" indent="-614194" defTabSz="508254">
+              <a:lnSpc>
+                <a:spcPct val="200000"/>
+              </a:lnSpc>
+              <a:spcBef>
+                <a:spcPts val="2400"/>
+              </a:spcBef>
+              <a:buSzPct val="40000"/>
+              <a:buBlip>
+                <a:blip r:embed="rId2"/>
+              </a:buBlip>
+              <a:defRPr cap="none" spc="0" sz="5500">
+                <a:latin typeface="Avenir Next Medium"/>
+                <a:ea typeface="Avenir Next Medium"/>
+                <a:cs typeface="Avenir Next Medium"/>
+                <a:sym typeface="Avenir Next Medium"/>
+              </a:defRPr>
+            </a:pPr>
+            <a:r>
+              <a:t>Segments data</a:t>
+            </a:r>
+            <a:r>
+              <a:t> along multiple axes</a:t>
             </a:r>
           </a:p>
         </p:txBody>
@@ -7417,51 +7429,26 @@
           <a:chExt cx="0" cy="0"/>
         </a:xfrm>
       </p:grpSpPr>
-      <p:sp>
-        <p:nvSpPr>
-          <p:cNvPr id="275" name="Shape 275"/>
-          <p:cNvSpPr/>
-          <p:nvPr>
-            <p:ph type="title"/>
-          </p:nvPr>
-        </p:nvSpPr>
+      <p:pic>
+        <p:nvPicPr>
+          <p:cNvPr id="276" name="pasted-image.tiff"/>
+          <p:cNvPicPr>
+            <a:picLocks noChangeAspect="1"/>
+          </p:cNvPicPr>
+          <p:nvPr/>
+        </p:nvPicPr>
+        <p:blipFill>
+          <a:blip r:embed="rId2">
+            <a:extLst/>
+          </a:blip>
+          <a:stretch>
+            <a:fillRect/>
+          </a:stretch>
+        </p:blipFill>
         <p:spPr>
           <a:xfrm>
-            <a:off x="406400" y="1536700"/>
-            <a:ext cx="12192000" cy="1169260"/>
-          </a:xfrm>
-          <a:prstGeom prst="rect">
-            <a:avLst/>
-          </a:prstGeom>
-        </p:spPr>
-        <p:txBody>
-          <a:bodyPr/>
-          <a:lstStyle>
-            <a:lvl1pPr defTabSz="403097">
-              <a:spcBef>
-                <a:spcPts val="1900"/>
-              </a:spcBef>
-              <a:defRPr sz="8280"/>
-            </a:lvl1pPr>
-          </a:lstStyle>
-          <a:p>
-            <a:pPr/>
-            <a:r>
-              <a:t>GRoupBY</a:t>
-            </a:r>
-          </a:p>
-        </p:txBody>
-      </p:sp>
-      <p:sp>
-        <p:nvSpPr>
-          <p:cNvPr id="276" name="Shape 276"/>
-          <p:cNvSpPr/>
-          <p:nvPr/>
-        </p:nvSpPr>
-        <p:spPr>
-          <a:xfrm>
-            <a:off x="510396" y="4438650"/>
-            <a:ext cx="12946701" cy="876301"/>
+            <a:off x="11464" y="26840"/>
+            <a:ext cx="12933226" cy="9699919"/>
           </a:xfrm>
           <a:prstGeom prst="rect">
             <a:avLst/>
@@ -7469,126 +7456,8 @@
           <a:ln w="12700">
             <a:miter lim="400000"/>
           </a:ln>
-          <a:extLst>
-            <a:ext uri="{C572A759-6A51-4108-AA02-DFA0A04FC94B}">
-              <ma14:wrappingTextBoxFlag xmlns:ma14="http://schemas.microsoft.com/office/mac/drawingml/2011/main" val="1"/>
-            </a:ext>
-          </a:extLst>
-        </p:spPr>
-        <p:txBody>
-          <a:bodyPr lIns="50800" tIns="50800" rIns="50800" bIns="50800" anchor="ctr">
-            <a:spAutoFit/>
-          </a:bodyPr>
-          <a:lstStyle>
-            <a:lvl1pPr>
-              <a:defRPr sz="5100">
-                <a:latin typeface="Anonymous Pro for Powerline"/>
-                <a:ea typeface="Anonymous Pro for Powerline"/>
-                <a:cs typeface="Anonymous Pro for Powerline"/>
-                <a:sym typeface="Anonymous Pro for Powerline"/>
-              </a:defRPr>
-            </a:lvl1pPr>
-          </a:lstStyle>
-          <a:p>
-            <a:pPr/>
-            <a:r>
-              <a:t>df.groupby(“first_name”).sum()</a:t>
-            </a:r>
-          </a:p>
-        </p:txBody>
-      </p:sp>
-      <p:sp>
-        <p:nvSpPr>
-          <p:cNvPr id="277" name="Shape 277"/>
-          <p:cNvSpPr/>
-          <p:nvPr/>
-        </p:nvSpPr>
-        <p:spPr>
-          <a:xfrm rot="16200000">
-            <a:off x="9249547" y="6141193"/>
-            <a:ext cx="1620784" cy="518251"/>
-          </a:xfrm>
-          <a:prstGeom prst="rightArrow">
-            <a:avLst>
-              <a:gd name="adj1" fmla="val 34174"/>
-              <a:gd name="adj2" fmla="val 145948"/>
-            </a:avLst>
-          </a:prstGeom>
-          <a:solidFill>
-            <a:schemeClr val="accent5"/>
-          </a:solidFill>
-          <a:ln w="12700">
-            <a:miter lim="400000"/>
-          </a:ln>
-        </p:spPr>
-        <p:txBody>
-          <a:bodyPr lIns="50800" tIns="50800" rIns="50800" bIns="50800" anchor="ctr"/>
-          <a:lstStyle/>
-          <a:p>
-            <a:pPr algn="ctr">
-              <a:lnSpc>
-                <a:spcPct val="80000"/>
-              </a:lnSpc>
-              <a:spcBef>
-                <a:spcPts val="0"/>
-              </a:spcBef>
-              <a:defRPr cap="all" sz="2800">
-                <a:solidFill>
-                  <a:srgbClr val="FFFFFF"/>
-                </a:solidFill>
-                <a:latin typeface="+mn-lt"/>
-                <a:ea typeface="+mn-ea"/>
-                <a:cs typeface="+mn-cs"/>
-                <a:sym typeface="DIN Condensed"/>
-              </a:defRPr>
-            </a:pPr>
-          </a:p>
-        </p:txBody>
-      </p:sp>
-      <p:sp>
-        <p:nvSpPr>
-          <p:cNvPr id="278" name="Shape 278"/>
-          <p:cNvSpPr/>
-          <p:nvPr/>
-        </p:nvSpPr>
-        <p:spPr>
-          <a:xfrm>
-            <a:off x="66166" y="7485687"/>
-            <a:ext cx="12164569" cy="1143001"/>
-          </a:xfrm>
-          <a:prstGeom prst="rect">
-            <a:avLst/>
-          </a:prstGeom>
-          <a:ln w="12700">
-            <a:miter lim="400000"/>
-          </a:ln>
-          <a:extLst>
-            <a:ext uri="{C572A759-6A51-4108-AA02-DFA0A04FC94B}">
-              <ma14:wrappingTextBoxFlag xmlns:ma14="http://schemas.microsoft.com/office/mac/drawingml/2011/main" val="1"/>
-            </a:ext>
-          </a:extLst>
-        </p:spPr>
-        <p:txBody>
-          <a:bodyPr wrap="none" lIns="50800" tIns="50800" rIns="50800" bIns="50800" anchor="ctr">
-            <a:spAutoFit/>
-          </a:bodyPr>
-          <a:lstStyle>
-            <a:lvl1pPr>
-              <a:defRPr sz="6000">
-                <a:solidFill>
-                  <a:schemeClr val="accent5"/>
-                </a:solidFill>
-              </a:defRPr>
-            </a:lvl1pPr>
-          </a:lstStyle>
-          <a:p>
-            <a:pPr/>
-            <a:r>
-              <a:t>How other columns are combined </a:t>
-            </a:r>
-          </a:p>
-        </p:txBody>
-      </p:sp>
+        </p:spPr>
+      </p:pic>
     </p:spTree>
   </p:cSld>
   <p:clrMapOvr>
@@ -7617,7 +7486,7 @@
       </p:grpSpPr>
       <p:sp>
         <p:nvSpPr>
-          <p:cNvPr id="280" name="Shape 280"/>
+          <p:cNvPr id="278" name="Shape 278"/>
           <p:cNvSpPr/>
           <p:nvPr>
             <p:ph type="title"/>
@@ -7625,8 +7494,8 @@
         </p:nvSpPr>
         <p:spPr>
           <a:xfrm>
-            <a:off x="3279937" y="4128458"/>
-            <a:ext cx="6444926" cy="1982356"/>
+            <a:off x="406400" y="1536700"/>
+            <a:ext cx="12192000" cy="1169260"/>
           </a:xfrm>
           <a:prstGeom prst="rect">
             <a:avLst/>
@@ -7635,14 +7504,129 @@
         <p:txBody>
           <a:bodyPr/>
           <a:lstStyle>
-            <a:lvl1pPr defTabSz="502412">
-              <a:defRPr sz="14620"/>
+            <a:lvl1pPr defTabSz="403097">
+              <a:spcBef>
+                <a:spcPts val="1900"/>
+              </a:spcBef>
+              <a:defRPr sz="8280"/>
             </a:lvl1pPr>
           </a:lstStyle>
           <a:p>
             <a:pPr/>
             <a:r>
-              <a:t>Exercises</a:t>
+              <a:t>Pivot table syntax</a:t>
+            </a:r>
+          </a:p>
+        </p:txBody>
+      </p:sp>
+      <p:sp>
+        <p:nvSpPr>
+          <p:cNvPr id="279" name="Shape 279"/>
+          <p:cNvSpPr/>
+          <p:nvPr/>
+        </p:nvSpPr>
+        <p:spPr>
+          <a:xfrm>
+            <a:off x="434394" y="3746499"/>
+            <a:ext cx="12946701" cy="4114801"/>
+          </a:xfrm>
+          <a:prstGeom prst="rect">
+            <a:avLst/>
+          </a:prstGeom>
+          <a:ln w="12700">
+            <a:miter lim="400000"/>
+          </a:ln>
+          <a:extLst>
+            <a:ext uri="{C572A759-6A51-4108-AA02-DFA0A04FC94B}">
+              <ma14:wrappingTextBoxFlag xmlns:ma14="http://schemas.microsoft.com/office/mac/drawingml/2011/main" val="1"/>
+            </a:ext>
+          </a:extLst>
+        </p:spPr>
+        <p:txBody>
+          <a:bodyPr lIns="50800" tIns="50800" rIns="50800" bIns="50800" anchor="ctr">
+            <a:spAutoFit/>
+          </a:bodyPr>
+          <a:lstStyle/>
+          <a:p>
+            <a:pPr>
+              <a:defRPr sz="5100">
+                <a:latin typeface="Anonymous Pro for Powerline"/>
+                <a:ea typeface="Anonymous Pro for Powerline"/>
+                <a:cs typeface="Anonymous Pro for Powerline"/>
+                <a:sym typeface="Anonymous Pro for Powerline"/>
+              </a:defRPr>
+            </a:pPr>
+            <a:r>
+              <a:t>sales_df.pivot_table(</a:t>
+            </a:r>
+          </a:p>
+          <a:p>
+            <a:pPr>
+              <a:defRPr sz="5100">
+                <a:latin typeface="Anonymous Pro for Powerline"/>
+                <a:ea typeface="Anonymous Pro for Powerline"/>
+                <a:cs typeface="Anonymous Pro for Powerline"/>
+                <a:sym typeface="Anonymous Pro for Powerline"/>
+              </a:defRPr>
+            </a:pPr>
+            <a:r>
+              <a:t>    </a:t>
+            </a:r>
+            <a:r>
+              <a:rPr>
+                <a:solidFill>
+                  <a:schemeClr val="accent4">
+                    <a:hueOff val="414058"/>
+                    <a:satOff val="2144"/>
+                    <a:lumOff val="10379"/>
+                  </a:schemeClr>
+                </a:solidFill>
+              </a:rPr>
+              <a:t>values</a:t>
+            </a:r>
+            <a:r>
+              <a:t>=[“quantity”,”price”],</a:t>
+            </a:r>
+          </a:p>
+          <a:p>
+            <a:pPr>
+              <a:defRPr sz="5100">
+                <a:latin typeface="Anonymous Pro for Powerline"/>
+                <a:ea typeface="Anonymous Pro for Powerline"/>
+                <a:cs typeface="Anonymous Pro for Powerline"/>
+                <a:sym typeface="Anonymous Pro for Powerline"/>
+              </a:defRPr>
+            </a:pPr>
+            <a:r>
+              <a:t>    </a:t>
+            </a:r>
+            <a:r>
+              <a:rPr>
+                <a:solidFill>
+                  <a:schemeClr val="accent1">
+                    <a:hueOff val="-84091"/>
+                    <a:satOff val="15316"/>
+                    <a:lumOff val="24313"/>
+                  </a:schemeClr>
+                </a:solidFill>
+              </a:rPr>
+              <a:t>index</a:t>
+            </a:r>
+            <a:r>
+              <a:t>=“name”</a:t>
+            </a:r>
+          </a:p>
+          <a:p>
+            <a:pPr>
+              <a:defRPr sz="5100">
+                <a:latin typeface="Anonymous Pro for Powerline"/>
+                <a:ea typeface="Anonymous Pro for Powerline"/>
+                <a:cs typeface="Anonymous Pro for Powerline"/>
+                <a:sym typeface="Anonymous Pro for Powerline"/>
+              </a:defRPr>
+            </a:pPr>
+            <a:r>
+              <a:t>)</a:t>
             </a:r>
           </a:p>
         </p:txBody>
@@ -7675,7 +7659,7 @@
       </p:grpSpPr>
       <p:sp>
         <p:nvSpPr>
-          <p:cNvPr id="282" name="Shape 282"/>
+          <p:cNvPr id="281" name="Shape 281"/>
           <p:cNvSpPr/>
           <p:nvPr>
             <p:ph type="title"/>
@@ -7683,8 +7667,8 @@
         </p:nvSpPr>
         <p:spPr>
           <a:xfrm>
-            <a:off x="2595467" y="4055489"/>
-            <a:ext cx="7813866" cy="1982355"/>
+            <a:off x="406400" y="1536700"/>
+            <a:ext cx="12192000" cy="1169260"/>
           </a:xfrm>
           <a:prstGeom prst="rect">
             <a:avLst/>
@@ -7693,14 +7677,180 @@
         <p:txBody>
           <a:bodyPr/>
           <a:lstStyle>
-            <a:lvl1pPr defTabSz="490727">
-              <a:defRPr sz="14280"/>
+            <a:lvl1pPr defTabSz="403097">
+              <a:spcBef>
+                <a:spcPts val="1900"/>
+              </a:spcBef>
+              <a:defRPr sz="8280"/>
             </a:lvl1pPr>
           </a:lstStyle>
           <a:p>
             <a:pPr/>
             <a:r>
-              <a:t>Pivot Tables</a:t>
+              <a:t>Pivot table syntax</a:t>
+            </a:r>
+          </a:p>
+        </p:txBody>
+      </p:sp>
+      <p:sp>
+        <p:nvSpPr>
+          <p:cNvPr id="282" name="Shape 282"/>
+          <p:cNvSpPr/>
+          <p:nvPr/>
+        </p:nvSpPr>
+        <p:spPr>
+          <a:xfrm>
+            <a:off x="434394" y="3746499"/>
+            <a:ext cx="12946701" cy="4114801"/>
+          </a:xfrm>
+          <a:prstGeom prst="rect">
+            <a:avLst/>
+          </a:prstGeom>
+          <a:ln w="12700">
+            <a:miter lim="400000"/>
+          </a:ln>
+          <a:extLst>
+            <a:ext uri="{C572A759-6A51-4108-AA02-DFA0A04FC94B}">
+              <ma14:wrappingTextBoxFlag xmlns:ma14="http://schemas.microsoft.com/office/mac/drawingml/2011/main" val="1"/>
+            </a:ext>
+          </a:extLst>
+        </p:spPr>
+        <p:txBody>
+          <a:bodyPr lIns="50800" tIns="50800" rIns="50800" bIns="50800" anchor="ctr">
+            <a:spAutoFit/>
+          </a:bodyPr>
+          <a:lstStyle/>
+          <a:p>
+            <a:pPr>
+              <a:defRPr sz="5100">
+                <a:latin typeface="Anonymous Pro for Powerline"/>
+                <a:ea typeface="Anonymous Pro for Powerline"/>
+                <a:cs typeface="Anonymous Pro for Powerline"/>
+                <a:sym typeface="Anonymous Pro for Powerline"/>
+              </a:defRPr>
+            </a:pPr>
+            <a:r>
+              <a:t>sales_df.pivot_table(</a:t>
+            </a:r>
+          </a:p>
+          <a:p>
+            <a:pPr>
+              <a:defRPr sz="5100">
+                <a:latin typeface="Anonymous Pro for Powerline"/>
+                <a:ea typeface="Anonymous Pro for Powerline"/>
+                <a:cs typeface="Anonymous Pro for Powerline"/>
+                <a:sym typeface="Anonymous Pro for Powerline"/>
+              </a:defRPr>
+            </a:pPr>
+            <a:r>
+              <a:t>    </a:t>
+            </a:r>
+            <a:r>
+              <a:rPr>
+                <a:solidFill>
+                  <a:schemeClr val="accent4">
+                    <a:hueOff val="414058"/>
+                    <a:satOff val="2144"/>
+                    <a:lumOff val="10379"/>
+                  </a:schemeClr>
+                </a:solidFill>
+              </a:rPr>
+              <a:t>values</a:t>
+            </a:r>
+            <a:r>
+              <a:t>=[“quantity”,”price”],</a:t>
+            </a:r>
+          </a:p>
+          <a:p>
+            <a:pPr>
+              <a:defRPr sz="5100">
+                <a:latin typeface="Anonymous Pro for Powerline"/>
+                <a:ea typeface="Anonymous Pro for Powerline"/>
+                <a:cs typeface="Anonymous Pro for Powerline"/>
+                <a:sym typeface="Anonymous Pro for Powerline"/>
+              </a:defRPr>
+            </a:pPr>
+            <a:r>
+              <a:t>    </a:t>
+            </a:r>
+            <a:r>
+              <a:rPr>
+                <a:solidFill>
+                  <a:schemeClr val="accent1">
+                    <a:hueOff val="-84091"/>
+                    <a:satOff val="15316"/>
+                    <a:lumOff val="24313"/>
+                  </a:schemeClr>
+                </a:solidFill>
+              </a:rPr>
+              <a:t>index</a:t>
+            </a:r>
+            <a:r>
+              <a:t>=“name”</a:t>
+            </a:r>
+          </a:p>
+          <a:p>
+            <a:pPr>
+              <a:defRPr sz="5100">
+                <a:latin typeface="Anonymous Pro for Powerline"/>
+                <a:ea typeface="Anonymous Pro for Powerline"/>
+                <a:cs typeface="Anonymous Pro for Powerline"/>
+                <a:sym typeface="Anonymous Pro for Powerline"/>
+              </a:defRPr>
+            </a:pPr>
+            <a:r>
+              <a:t>)</a:t>
+            </a:r>
+          </a:p>
+        </p:txBody>
+      </p:sp>
+      <p:sp>
+        <p:nvSpPr>
+          <p:cNvPr id="283" name="Shape 283"/>
+          <p:cNvSpPr/>
+          <p:nvPr/>
+        </p:nvSpPr>
+        <p:spPr>
+          <a:xfrm>
+            <a:off x="1561684" y="8029327"/>
+            <a:ext cx="9869488" cy="1079501"/>
+          </a:xfrm>
+          <a:prstGeom prst="rect">
+            <a:avLst/>
+          </a:prstGeom>
+          <a:ln w="12700">
+            <a:miter lim="400000"/>
+          </a:ln>
+          <a:extLst>
+            <a:ext uri="{C572A759-6A51-4108-AA02-DFA0A04FC94B}">
+              <ma14:wrappingTextBoxFlag xmlns:ma14="http://schemas.microsoft.com/office/mac/drawingml/2011/main" val="1"/>
+            </a:ext>
+          </a:extLst>
+        </p:spPr>
+        <p:txBody>
+          <a:bodyPr wrap="none" lIns="50800" tIns="50800" rIns="50800" bIns="50800" anchor="ctr">
+            <a:spAutoFit/>
+          </a:bodyPr>
+          <a:lstStyle>
+            <a:lvl1pPr>
+              <a:spcBef>
+                <a:spcPts val="2800"/>
+              </a:spcBef>
+              <a:defRPr sz="6400">
+                <a:solidFill>
+                  <a:schemeClr val="accent5"/>
+                </a:solidFill>
+                <a:latin typeface="Courier"/>
+                <a:ea typeface="Courier"/>
+                <a:cs typeface="Courier"/>
+                <a:sym typeface="Courier"/>
+              </a:defRPr>
+            </a:lvl1pPr>
+          </a:lstStyle>
+          <a:p>
+            <a:pPr/>
+            <a:r>
+              <a:t>takes AVG by default</a:t>
             </a:r>
           </a:p>
         </p:txBody>
@@ -7733,7 +7883,7 @@
       </p:grpSpPr>
       <p:sp>
         <p:nvSpPr>
-          <p:cNvPr id="284" name="Shape 284"/>
+          <p:cNvPr id="285" name="Shape 285"/>
           <p:cNvSpPr/>
           <p:nvPr>
             <p:ph type="title"/>
@@ -7742,7 +7892,7 @@
         <p:spPr>
           <a:xfrm>
             <a:off x="406400" y="1536700"/>
-            <a:ext cx="12192000" cy="1169261"/>
+            <a:ext cx="12192000" cy="1169260"/>
           </a:xfrm>
           <a:prstGeom prst="rect">
             <a:avLst/>
@@ -7755,84 +7905,149 @@
               <a:spcBef>
                 <a:spcPts val="1900"/>
               </a:spcBef>
-              <a:defRPr sz="8200"/>
+              <a:defRPr sz="8280"/>
             </a:lvl1pPr>
           </a:lstStyle>
           <a:p>
             <a:pPr/>
             <a:r>
-              <a:t>Pivot table</a:t>
-            </a:r>
-          </a:p>
-        </p:txBody>
-      </p:sp>
-      <p:sp>
-        <p:nvSpPr>
-          <p:cNvPr id="285" name="Shape 285"/>
-          <p:cNvSpPr/>
-          <p:nvPr>
-            <p:ph type="body" sz="half" idx="1"/>
-          </p:nvPr>
+              <a:t>Pivot table syntax</a:t>
+            </a:r>
+          </a:p>
+        </p:txBody>
+      </p:sp>
+      <p:sp>
+        <p:nvSpPr>
+          <p:cNvPr id="286" name="Shape 286"/>
+          <p:cNvSpPr/>
+          <p:nvPr/>
         </p:nvSpPr>
         <p:spPr>
           <a:xfrm>
-            <a:off x="406400" y="3953767"/>
-            <a:ext cx="12192000" cy="2531602"/>
+            <a:off x="434394" y="3206749"/>
+            <a:ext cx="12946701" cy="5194301"/>
           </a:xfrm>
           <a:prstGeom prst="rect">
             <a:avLst/>
           </a:prstGeom>
-        </p:spPr>
-        <p:txBody>
-          <a:bodyPr anchor="t"/>
+          <a:ln w="12700">
+            <a:miter lim="400000"/>
+          </a:ln>
+          <a:extLst>
+            <a:ext uri="{C572A759-6A51-4108-AA02-DFA0A04FC94B}">
+              <ma14:wrappingTextBoxFlag xmlns:ma14="http://schemas.microsoft.com/office/mac/drawingml/2011/main" val="1"/>
+            </a:ext>
+          </a:extLst>
+        </p:spPr>
+        <p:txBody>
+          <a:bodyPr lIns="50800" tIns="50800" rIns="50800" bIns="50800" anchor="ctr">
+            <a:spAutoFit/>
+          </a:bodyPr>
           <a:lstStyle/>
           <a:p>
-            <a:pPr marL="614194" indent="-614194" defTabSz="508254">
-              <a:lnSpc>
-                <a:spcPct val="100000"/>
-              </a:lnSpc>
-              <a:spcBef>
-                <a:spcPts val="2400"/>
-              </a:spcBef>
-              <a:buSzPct val="40000"/>
-              <a:buBlip>
-                <a:blip r:embed="rId2"/>
-              </a:buBlip>
-              <a:defRPr cap="none" spc="0" sz="5500">
-                <a:latin typeface="Avenir Next Medium"/>
-                <a:ea typeface="Avenir Next Medium"/>
-                <a:cs typeface="Avenir Next Medium"/>
-                <a:sym typeface="Avenir Next Medium"/>
+            <a:pPr>
+              <a:defRPr sz="5100">
+                <a:latin typeface="Anonymous Pro for Powerline"/>
+                <a:ea typeface="Anonymous Pro for Powerline"/>
+                <a:cs typeface="Anonymous Pro for Powerline"/>
+                <a:sym typeface="Anonymous Pro for Powerline"/>
               </a:defRPr>
             </a:pPr>
             <a:r>
-              <a:t>Similar to groupby</a:t>
-            </a:r>
-          </a:p>
-          <a:p>
-            <a:pPr marL="614194" indent="-614194" defTabSz="508254">
-              <a:lnSpc>
-                <a:spcPct val="200000"/>
-              </a:lnSpc>
-              <a:spcBef>
-                <a:spcPts val="2400"/>
-              </a:spcBef>
-              <a:buSzPct val="40000"/>
-              <a:buBlip>
-                <a:blip r:embed="rId2"/>
-              </a:buBlip>
-              <a:defRPr cap="none" spc="0" sz="5500">
-                <a:latin typeface="Avenir Next Medium"/>
-                <a:ea typeface="Avenir Next Medium"/>
-                <a:cs typeface="Avenir Next Medium"/>
-                <a:sym typeface="Avenir Next Medium"/>
+              <a:t>sales_df.pivot_table(</a:t>
+            </a:r>
+          </a:p>
+          <a:p>
+            <a:pPr>
+              <a:defRPr sz="5100">
+                <a:latin typeface="Anonymous Pro for Powerline"/>
+                <a:ea typeface="Anonymous Pro for Powerline"/>
+                <a:cs typeface="Anonymous Pro for Powerline"/>
+                <a:sym typeface="Anonymous Pro for Powerline"/>
               </a:defRPr>
             </a:pPr>
             <a:r>
-              <a:t>Segments data</a:t>
-            </a:r>
-            <a:r>
-              <a:t> along multiple axes</a:t>
+              <a:t>    </a:t>
+            </a:r>
+            <a:r>
+              <a:rPr>
+                <a:solidFill>
+                  <a:schemeClr val="accent4">
+                    <a:hueOff val="414058"/>
+                    <a:satOff val="2144"/>
+                    <a:lumOff val="10379"/>
+                  </a:schemeClr>
+                </a:solidFill>
+              </a:rPr>
+              <a:t>values</a:t>
+            </a:r>
+            <a:r>
+              <a:t>=[“quantity”,”price”],</a:t>
+            </a:r>
+          </a:p>
+          <a:p>
+            <a:pPr>
+              <a:defRPr sz="5100">
+                <a:latin typeface="Anonymous Pro for Powerline"/>
+                <a:ea typeface="Anonymous Pro for Powerline"/>
+                <a:cs typeface="Anonymous Pro for Powerline"/>
+                <a:sym typeface="Anonymous Pro for Powerline"/>
+              </a:defRPr>
+            </a:pPr>
+            <a:r>
+              <a:t>    </a:t>
+            </a:r>
+            <a:r>
+              <a:rPr>
+                <a:solidFill>
+                  <a:schemeClr val="accent1">
+                    <a:hueOff val="-84091"/>
+                    <a:satOff val="15316"/>
+                    <a:lumOff val="24313"/>
+                  </a:schemeClr>
+                </a:solidFill>
+              </a:rPr>
+              <a:t>index</a:t>
+            </a:r>
+            <a:r>
+              <a:t>=“name”,</a:t>
+            </a:r>
+          </a:p>
+          <a:p>
+            <a:pPr>
+              <a:defRPr sz="5100">
+                <a:latin typeface="Anonymous Pro for Powerline"/>
+                <a:ea typeface="Anonymous Pro for Powerline"/>
+                <a:cs typeface="Anonymous Pro for Powerline"/>
+                <a:sym typeface="Anonymous Pro for Powerline"/>
+              </a:defRPr>
+            </a:pPr>
+            <a:r>
+              <a:t>    </a:t>
+            </a:r>
+            <a:r>
+              <a:rPr>
+                <a:solidFill>
+                  <a:schemeClr val="accent5"/>
+                </a:solidFill>
+              </a:rPr>
+              <a:t>aggfunc</a:t>
+            </a:r>
+            <a:r>
+              <a:t>=“sum”</a:t>
+            </a:r>
+          </a:p>
+          <a:p>
+            <a:pPr>
+              <a:defRPr sz="5100">
+                <a:latin typeface="Anonymous Pro for Powerline"/>
+                <a:ea typeface="Anonymous Pro for Powerline"/>
+                <a:cs typeface="Anonymous Pro for Powerline"/>
+                <a:sym typeface="Anonymous Pro for Powerline"/>
+              </a:defRPr>
+            </a:pPr>
+            <a:r>
+              <a:t>)</a:t>
             </a:r>
           </a:p>
         </p:txBody>
@@ -7863,186 +8078,35 @@
           <a:chExt cx="0" cy="0"/>
         </a:xfrm>
       </p:grpSpPr>
-      <p:pic>
-        <p:nvPicPr>
-          <p:cNvPr id="287" name="pasted-image.tiff"/>
-          <p:cNvPicPr>
-            <a:picLocks noChangeAspect="1"/>
-          </p:cNvPicPr>
-          <p:nvPr/>
-        </p:nvPicPr>
-        <p:blipFill>
-          <a:blip r:embed="rId2">
-            <a:extLst/>
-          </a:blip>
-          <a:srcRect l="29888" t="0" r="0" b="0"/>
-          <a:stretch>
-            <a:fillRect/>
-          </a:stretch>
-        </p:blipFill>
+      <p:sp>
+        <p:nvSpPr>
+          <p:cNvPr id="288" name="Shape 288"/>
+          <p:cNvSpPr/>
+          <p:nvPr>
+            <p:ph type="title"/>
+          </p:nvPr>
+        </p:nvSpPr>
         <p:spPr>
           <a:xfrm>
-            <a:off x="1152076" y="1891109"/>
-            <a:ext cx="6201518" cy="5971282"/>
+            <a:off x="2595467" y="4055489"/>
+            <a:ext cx="7813866" cy="1982355"/>
           </a:xfrm>
           <a:prstGeom prst="rect">
             <a:avLst/>
           </a:prstGeom>
-          <a:ln w="12700">
-            <a:miter lim="400000"/>
-          </a:ln>
-        </p:spPr>
-      </p:pic>
-      <p:pic>
-        <p:nvPicPr>
-          <p:cNvPr id="288" name="pasted-image.tiff"/>
-          <p:cNvPicPr>
-            <a:picLocks noChangeAspect="1"/>
-          </p:cNvPicPr>
-          <p:nvPr/>
-        </p:nvPicPr>
-        <p:blipFill>
-          <a:blip r:embed="rId3">
-            <a:extLst/>
-          </a:blip>
-          <a:stretch>
-            <a:fillRect/>
-          </a:stretch>
-        </p:blipFill>
-        <p:spPr>
-          <a:xfrm>
-            <a:off x="7300845" y="1891159"/>
-            <a:ext cx="3936294" cy="5971282"/>
-          </a:xfrm>
-          <a:prstGeom prst="rect">
-            <a:avLst/>
-          </a:prstGeom>
-          <a:ln w="12700">
-            <a:miter lim="400000"/>
-          </a:ln>
-        </p:spPr>
-      </p:pic>
-      <p:sp>
-        <p:nvSpPr>
-          <p:cNvPr id="289" name="Shape 289"/>
-          <p:cNvSpPr/>
-          <p:nvPr/>
-        </p:nvSpPr>
-        <p:spPr>
-          <a:xfrm>
-            <a:off x="1183292" y="1906773"/>
-            <a:ext cx="6094544" cy="5940054"/>
-          </a:xfrm>
-          <a:prstGeom prst="rect">
-            <a:avLst/>
-          </a:prstGeom>
-          <a:solidFill>
-            <a:schemeClr val="accent1">
-              <a:alpha val="26647"/>
-            </a:schemeClr>
-          </a:solidFill>
-          <a:ln w="12700">
-            <a:miter lim="400000"/>
-          </a:ln>
-        </p:spPr>
-        <p:txBody>
-          <a:bodyPr lIns="50800" tIns="50800" rIns="50800" bIns="50800" anchor="ctr"/>
-          <a:lstStyle/>
-          <a:p>
-            <a:pPr algn="ctr">
-              <a:lnSpc>
-                <a:spcPct val="80000"/>
-              </a:lnSpc>
-              <a:spcBef>
-                <a:spcPts val="0"/>
-              </a:spcBef>
-              <a:defRPr cap="all" sz="2800">
-                <a:solidFill>
-                  <a:srgbClr val="FFFFFF"/>
-                </a:solidFill>
-                <a:latin typeface="+mn-lt"/>
-                <a:ea typeface="+mn-ea"/>
-                <a:cs typeface="+mn-cs"/>
-                <a:sym typeface="DIN Condensed"/>
-              </a:defRPr>
-            </a:pPr>
-          </a:p>
-        </p:txBody>
-      </p:sp>
-      <p:pic>
-        <p:nvPicPr>
-          <p:cNvPr id="290" name="pasted-image.tiff"/>
-          <p:cNvPicPr>
-            <a:picLocks noChangeAspect="1"/>
-          </p:cNvPicPr>
-          <p:nvPr/>
-        </p:nvPicPr>
-        <p:blipFill>
-          <a:blip r:embed="rId2">
-            <a:extLst/>
-          </a:blip>
-          <a:srcRect l="0" t="85" r="91816" b="85"/>
-          <a:stretch>
-            <a:fillRect/>
-          </a:stretch>
-        </p:blipFill>
-        <p:spPr>
-          <a:xfrm>
-            <a:off x="435270" y="1891109"/>
-            <a:ext cx="725095" cy="5971282"/>
-          </a:xfrm>
-          <a:prstGeom prst="rect">
-            <a:avLst/>
-          </a:prstGeom>
-          <a:ln w="12700">
-            <a:miter lim="400000"/>
-          </a:ln>
-        </p:spPr>
-      </p:pic>
-      <p:sp>
-        <p:nvSpPr>
-          <p:cNvPr id="291" name="Shape 291"/>
-          <p:cNvSpPr/>
-          <p:nvPr/>
-        </p:nvSpPr>
-        <p:spPr>
-          <a:xfrm>
-            <a:off x="7300845" y="1882450"/>
-            <a:ext cx="3936294" cy="5940054"/>
-          </a:xfrm>
-          <a:prstGeom prst="rect">
-            <a:avLst/>
-          </a:prstGeom>
-          <a:solidFill>
-            <a:srgbClr val="FDED10">
-              <a:alpha val="30000"/>
-            </a:srgbClr>
-          </a:solidFill>
-          <a:ln w="12700">
-            <a:miter lim="400000"/>
-          </a:ln>
-        </p:spPr>
-        <p:txBody>
-          <a:bodyPr lIns="50800" tIns="50800" rIns="50800" bIns="50800" anchor="ctr"/>
-          <a:lstStyle/>
-          <a:p>
-            <a:pPr algn="ctr">
-              <a:lnSpc>
-                <a:spcPct val="80000"/>
-              </a:lnSpc>
-              <a:spcBef>
-                <a:spcPts val="0"/>
-              </a:spcBef>
-              <a:defRPr cap="all" sz="2800">
-                <a:solidFill>
-                  <a:srgbClr val="232323"/>
-                </a:solidFill>
-                <a:latin typeface="+mn-lt"/>
-                <a:ea typeface="+mn-ea"/>
-                <a:cs typeface="+mn-cs"/>
-                <a:sym typeface="DIN Condensed"/>
-              </a:defRPr>
-            </a:pPr>
+        </p:spPr>
+        <p:txBody>
+          <a:bodyPr/>
+          <a:lstStyle>
+            <a:lvl1pPr defTabSz="368045">
+              <a:defRPr sz="10710"/>
+            </a:lvl1pPr>
+          </a:lstStyle>
+          <a:p>
+            <a:pPr/>
+            <a:r>
+              <a:t>Beyond Groupby</a:t>
+            </a:r>
           </a:p>
         </p:txBody>
       </p:sp>
@@ -8072,156 +8136,106 @@
           <a:chExt cx="0" cy="0"/>
         </a:xfrm>
       </p:grpSpPr>
-      <p:pic>
-        <p:nvPicPr>
-          <p:cNvPr id="293" name="pasted-image.tiff"/>
-          <p:cNvPicPr>
-            <a:picLocks noChangeAspect="1"/>
-          </p:cNvPicPr>
-          <p:nvPr/>
-        </p:nvPicPr>
-        <p:blipFill>
-          <a:blip r:embed="rId2">
-            <a:extLst/>
-          </a:blip>
-          <a:stretch>
-            <a:fillRect/>
-          </a:stretch>
-        </p:blipFill>
+      <p:sp>
+        <p:nvSpPr>
+          <p:cNvPr id="290" name="Shape 290"/>
+          <p:cNvSpPr/>
+          <p:nvPr>
+            <p:ph type="title"/>
+          </p:nvPr>
+        </p:nvSpPr>
         <p:spPr>
           <a:xfrm>
-            <a:off x="950544" y="2251320"/>
-            <a:ext cx="4717139" cy="6254354"/>
+            <a:off x="406400" y="1536700"/>
+            <a:ext cx="12192000" cy="1169261"/>
           </a:xfrm>
           <a:prstGeom prst="rect">
             <a:avLst/>
           </a:prstGeom>
-          <a:ln w="12700">
-            <a:miter lim="400000"/>
-          </a:ln>
-        </p:spPr>
-      </p:pic>
-      <p:pic>
-        <p:nvPicPr>
-          <p:cNvPr id="294" name="pasted-image.tiff"/>
-          <p:cNvPicPr>
-            <a:picLocks noChangeAspect="1"/>
-          </p:cNvPicPr>
-          <p:nvPr/>
-        </p:nvPicPr>
-        <p:blipFill>
-          <a:blip r:embed="rId3">
-            <a:extLst/>
-          </a:blip>
-          <a:srcRect l="30967" t="0" r="0" b="0"/>
-          <a:stretch>
-            <a:fillRect/>
-          </a:stretch>
-        </p:blipFill>
+        </p:spPr>
+        <p:txBody>
+          <a:bodyPr/>
+          <a:lstStyle>
+            <a:lvl1pPr defTabSz="403097">
+              <a:spcBef>
+                <a:spcPts val="1900"/>
+              </a:spcBef>
+              <a:defRPr sz="8200"/>
+            </a:lvl1pPr>
+          </a:lstStyle>
+          <a:p>
+            <a:pPr/>
+            <a:r>
+              <a:t>Columns</a:t>
+            </a:r>
+          </a:p>
+        </p:txBody>
+      </p:sp>
+      <p:sp>
+        <p:nvSpPr>
+          <p:cNvPr id="291" name="Shape 291"/>
+          <p:cNvSpPr/>
+          <p:nvPr>
+            <p:ph type="body" idx="1"/>
+          </p:nvPr>
+        </p:nvSpPr>
         <p:spPr>
           <a:xfrm>
-            <a:off x="5666273" y="2270370"/>
-            <a:ext cx="6716327" cy="6254477"/>
+            <a:off x="406400" y="3953767"/>
+            <a:ext cx="12192000" cy="5463876"/>
           </a:xfrm>
           <a:prstGeom prst="rect">
             <a:avLst/>
           </a:prstGeom>
-          <a:ln w="12700">
-            <a:miter lim="400000"/>
-          </a:ln>
-        </p:spPr>
-      </p:pic>
-      <p:sp>
-        <p:nvSpPr>
-          <p:cNvPr id="295" name="Shape 295"/>
-          <p:cNvSpPr/>
-          <p:nvPr/>
-        </p:nvSpPr>
-        <p:spPr>
-          <a:xfrm>
-            <a:off x="955646" y="2270370"/>
-            <a:ext cx="4706935" cy="6254354"/>
-          </a:xfrm>
-          <a:prstGeom prst="rect">
-            <a:avLst/>
-          </a:prstGeom>
-          <a:solidFill>
-            <a:schemeClr val="accent1">
-              <a:alpha val="26647"/>
-            </a:schemeClr>
-          </a:solidFill>
-          <a:ln w="12700">
-            <a:miter lim="400000"/>
-          </a:ln>
-        </p:spPr>
-        <p:txBody>
-          <a:bodyPr lIns="50800" tIns="50800" rIns="50800" bIns="50800" anchor="ctr"/>
+        </p:spPr>
+        <p:txBody>
+          <a:bodyPr anchor="t"/>
           <a:lstStyle/>
           <a:p>
-            <a:pPr algn="ctr">
+            <a:pPr marL="614194" indent="-614194" defTabSz="508254">
               <a:lnSpc>
-                <a:spcPct val="80000"/>
+                <a:spcPct val="100000"/>
               </a:lnSpc>
               <a:spcBef>
-                <a:spcPts val="0"/>
+                <a:spcPts val="2400"/>
               </a:spcBef>
-              <a:defRPr cap="all" sz="2800">
-                <a:solidFill>
-                  <a:srgbClr val="FFFFFF"/>
-                </a:solidFill>
-                <a:latin typeface="+mn-lt"/>
-                <a:ea typeface="+mn-ea"/>
-                <a:cs typeface="+mn-cs"/>
-                <a:sym typeface="DIN Condensed"/>
+              <a:buSzPct val="40000"/>
+              <a:buBlip>
+                <a:blip r:embed="rId2"/>
+              </a:buBlip>
+              <a:defRPr cap="none" spc="0" sz="5500">
+                <a:latin typeface="Avenir Next Medium"/>
+                <a:ea typeface="Avenir Next Medium"/>
+                <a:cs typeface="Avenir Next Medium"/>
+                <a:sym typeface="Avenir Next Medium"/>
               </a:defRPr>
             </a:pPr>
-          </a:p>
-        </p:txBody>
-      </p:sp>
-      <p:sp>
-        <p:nvSpPr>
-          <p:cNvPr id="296" name="Shape 296"/>
-          <p:cNvSpPr/>
-          <p:nvPr/>
-        </p:nvSpPr>
-        <p:spPr>
-          <a:xfrm>
-            <a:off x="5646868" y="2247298"/>
-            <a:ext cx="6716317" cy="6262398"/>
-          </a:xfrm>
-          <a:prstGeom prst="rect">
-            <a:avLst/>
-          </a:prstGeom>
-          <a:solidFill>
-            <a:srgbClr val="FDED10">
-              <a:alpha val="30000"/>
-            </a:srgbClr>
-          </a:solidFill>
-          <a:ln w="12700">
-            <a:miter lim="400000"/>
-          </a:ln>
-        </p:spPr>
-        <p:txBody>
-          <a:bodyPr lIns="50800" tIns="50800" rIns="50800" bIns="50800" anchor="ctr"/>
-          <a:lstStyle/>
-          <a:p>
-            <a:pPr algn="ctr">
+            <a:r>
+              <a:t>Columns segment values, just like index</a:t>
+            </a:r>
+          </a:p>
+          <a:p>
+            <a:pPr marL="614194" indent="-614194" defTabSz="508254">
               <a:lnSpc>
-                <a:spcPct val="80000"/>
+                <a:spcPct val="100000"/>
               </a:lnSpc>
               <a:spcBef>
-                <a:spcPts val="0"/>
+                <a:spcPts val="2400"/>
               </a:spcBef>
-              <a:defRPr cap="all" sz="2800">
-                <a:solidFill>
-                  <a:srgbClr val="232323"/>
-                </a:solidFill>
-                <a:latin typeface="+mn-lt"/>
-                <a:ea typeface="+mn-ea"/>
-                <a:cs typeface="+mn-cs"/>
-                <a:sym typeface="DIN Condensed"/>
+              <a:buSzPct val="40000"/>
+              <a:buBlip>
+                <a:blip r:embed="rId2"/>
+              </a:buBlip>
+              <a:defRPr cap="none" spc="0" sz="5500">
+                <a:latin typeface="Avenir Next Medium"/>
+                <a:ea typeface="Avenir Next Medium"/>
+                <a:cs typeface="Avenir Next Medium"/>
+                <a:sym typeface="Avenir Next Medium"/>
               </a:defRPr>
             </a:pPr>
+            <a:r>
+              <a:t>Will form bins from unique values in column you specify</a:t>
+            </a:r>
           </a:p>
         </p:txBody>
       </p:sp>
@@ -8281,7 +8295,7 @@
           <a:p>
             <a:pPr/>
             <a:r>
-              <a:t>Dataframe</a:t>
+              <a:t>Specifying Data Types</a:t>
             </a:r>
           </a:p>
         </p:txBody>
@@ -8290,48 +8304,67 @@
         <p:nvSpPr>
           <p:cNvPr id="209" name="Shape 209"/>
           <p:cNvSpPr/>
-          <p:nvPr>
-            <p:ph type="body" idx="1"/>
-          </p:nvPr>
+          <p:nvPr/>
         </p:nvSpPr>
         <p:spPr>
           <a:xfrm>
-            <a:off x="406400" y="3953767"/>
-            <a:ext cx="12192000" cy="4612257"/>
+            <a:off x="455296" y="4286249"/>
+            <a:ext cx="12192002" cy="3035301"/>
           </a:xfrm>
           <a:prstGeom prst="rect">
             <a:avLst/>
           </a:prstGeom>
-        </p:spPr>
-        <p:txBody>
-          <a:bodyPr/>
+          <a:ln w="12700">
+            <a:miter lim="400000"/>
+          </a:ln>
+          <a:extLst>
+            <a:ext uri="{C572A759-6A51-4108-AA02-DFA0A04FC94B}">
+              <ma14:wrappingTextBoxFlag xmlns:ma14="http://schemas.microsoft.com/office/mac/drawingml/2011/main" val="1"/>
+            </a:ext>
+          </a:extLst>
+        </p:spPr>
+        <p:txBody>
+          <a:bodyPr lIns="50800" tIns="50800" rIns="50800" bIns="50800" anchor="ctr">
+            <a:spAutoFit/>
+          </a:bodyPr>
           <a:lstStyle/>
           <a:p>
-            <a:pPr marL="705970" indent="-705970">
-              <a:buClrTx/>
-              <a:buSzPct val="40000"/>
-              <a:buFontTx/>
-              <a:buBlip>
-                <a:blip r:embed="rId2"/>
-              </a:buBlip>
-              <a:defRPr sz="6400"/>
+            <a:pPr>
+              <a:defRPr sz="5100">
+                <a:latin typeface="Anonymous Pro for Powerline"/>
+                <a:ea typeface="Anonymous Pro for Powerline"/>
+                <a:cs typeface="Anonymous Pro for Powerline"/>
+                <a:sym typeface="Anonymous Pro for Powerline"/>
+              </a:defRPr>
             </a:pPr>
             <a:r>
-              <a:t>Similar to a spreadsheet</a:t>
-            </a:r>
-          </a:p>
-          <a:p>
-            <a:pPr marL="705970" indent="-705970">
-              <a:buClrTx/>
-              <a:buSzPct val="40000"/>
-              <a:buFontTx/>
-              <a:buBlip>
-                <a:blip r:embed="rId2"/>
-              </a:buBlip>
-              <a:defRPr sz="6400"/>
+              <a:t>pd.read_csv(“path_to_file”,</a:t>
+            </a:r>
+          </a:p>
+          <a:p>
+            <a:pPr>
+              <a:defRPr sz="5100">
+                <a:latin typeface="Anonymous Pro for Powerline"/>
+                <a:ea typeface="Anonymous Pro for Powerline"/>
+                <a:cs typeface="Anonymous Pro for Powerline"/>
+                <a:sym typeface="Anonymous Pro for Powerline"/>
+              </a:defRPr>
             </a:pPr>
             <a:r>
-              <a:t>Columns are Numpy arrays with special index</a:t>
+              <a:t>             dtype={“ZIP”: “str”})</a:t>
+            </a:r>
+          </a:p>
+          <a:p>
+            <a:pPr>
+              <a:defRPr sz="5100">
+                <a:latin typeface="Anonymous Pro for Powerline"/>
+                <a:ea typeface="Anonymous Pro for Powerline"/>
+                <a:cs typeface="Anonymous Pro for Powerline"/>
+                <a:sym typeface="Anonymous Pro for Powerline"/>
+              </a:defRPr>
+            </a:pPr>
+            <a:r>
+              <a:t> </a:t>
             </a:r>
           </a:p>
         </p:txBody>
@@ -8362,51 +8395,26 @@
           <a:chExt cx="0" cy="0"/>
         </a:xfrm>
       </p:grpSpPr>
-      <p:sp>
-        <p:nvSpPr>
-          <p:cNvPr id="298" name="Shape 298"/>
-          <p:cNvSpPr/>
-          <p:nvPr>
-            <p:ph type="title"/>
-          </p:nvPr>
-        </p:nvSpPr>
+      <p:pic>
+        <p:nvPicPr>
+          <p:cNvPr id="293" name="pasted-image.png"/>
+          <p:cNvPicPr>
+            <a:picLocks noChangeAspect="1"/>
+          </p:cNvPicPr>
+          <p:nvPr/>
+        </p:nvPicPr>
+        <p:blipFill>
+          <a:blip r:embed="rId2">
+            <a:extLst/>
+          </a:blip>
+          <a:stretch>
+            <a:fillRect/>
+          </a:stretch>
+        </p:blipFill>
         <p:spPr>
           <a:xfrm>
-            <a:off x="406400" y="1536700"/>
-            <a:ext cx="12192000" cy="1169260"/>
-          </a:xfrm>
-          <a:prstGeom prst="rect">
-            <a:avLst/>
-          </a:prstGeom>
-        </p:spPr>
-        <p:txBody>
-          <a:bodyPr/>
-          <a:lstStyle>
-            <a:lvl1pPr defTabSz="403097">
-              <a:spcBef>
-                <a:spcPts val="1900"/>
-              </a:spcBef>
-              <a:defRPr sz="8280"/>
-            </a:lvl1pPr>
-          </a:lstStyle>
-          <a:p>
-            <a:pPr/>
-            <a:r>
-              <a:t>Pivot table syntax</a:t>
-            </a:r>
-          </a:p>
-        </p:txBody>
-      </p:sp>
-      <p:sp>
-        <p:nvSpPr>
-          <p:cNvPr id="299" name="Shape 299"/>
-          <p:cNvSpPr/>
-          <p:nvPr/>
-        </p:nvSpPr>
-        <p:spPr>
-          <a:xfrm>
-            <a:off x="434394" y="3746499"/>
-            <a:ext cx="12946701" cy="4114801"/>
+            <a:off x="20873" y="1540407"/>
+            <a:ext cx="13004801" cy="6694275"/>
           </a:xfrm>
           <a:prstGeom prst="rect">
             <a:avLst/>
@@ -8414,101 +8422,8 @@
           <a:ln w="12700">
             <a:miter lim="400000"/>
           </a:ln>
-          <a:extLst>
-            <a:ext uri="{C572A759-6A51-4108-AA02-DFA0A04FC94B}">
-              <ma14:wrappingTextBoxFlag xmlns:ma14="http://schemas.microsoft.com/office/mac/drawingml/2011/main" val="1"/>
-            </a:ext>
-          </a:extLst>
-        </p:spPr>
-        <p:txBody>
-          <a:bodyPr lIns="50800" tIns="50800" rIns="50800" bIns="50800" anchor="ctr">
-            <a:spAutoFit/>
-          </a:bodyPr>
-          <a:lstStyle/>
-          <a:p>
-            <a:pPr>
-              <a:defRPr sz="5100">
-                <a:latin typeface="Anonymous Pro for Powerline"/>
-                <a:ea typeface="Anonymous Pro for Powerline"/>
-                <a:cs typeface="Anonymous Pro for Powerline"/>
-                <a:sym typeface="Anonymous Pro for Powerline"/>
-              </a:defRPr>
-            </a:pPr>
-            <a:r>
-              <a:t>sales_df.pivot_table(</a:t>
-            </a:r>
-          </a:p>
-          <a:p>
-            <a:pPr>
-              <a:defRPr sz="5100">
-                <a:latin typeface="Anonymous Pro for Powerline"/>
-                <a:ea typeface="Anonymous Pro for Powerline"/>
-                <a:cs typeface="Anonymous Pro for Powerline"/>
-                <a:sym typeface="Anonymous Pro for Powerline"/>
-              </a:defRPr>
-            </a:pPr>
-            <a:r>
-              <a:t>    </a:t>
-            </a:r>
-            <a:r>
-              <a:rPr>
-                <a:solidFill>
-                  <a:schemeClr val="accent4">
-                    <a:hueOff val="414058"/>
-                    <a:satOff val="2144"/>
-                    <a:lumOff val="10379"/>
-                  </a:schemeClr>
-                </a:solidFill>
-              </a:rPr>
-              <a:t>values</a:t>
-            </a:r>
-            <a:r>
-              <a:t>=[“quantity”,”price”],</a:t>
-            </a:r>
-          </a:p>
-          <a:p>
-            <a:pPr>
-              <a:defRPr sz="5100">
-                <a:latin typeface="Anonymous Pro for Powerline"/>
-                <a:ea typeface="Anonymous Pro for Powerline"/>
-                <a:cs typeface="Anonymous Pro for Powerline"/>
-                <a:sym typeface="Anonymous Pro for Powerline"/>
-              </a:defRPr>
-            </a:pPr>
-            <a:r>
-              <a:t>    </a:t>
-            </a:r>
-            <a:r>
-              <a:rPr>
-                <a:solidFill>
-                  <a:schemeClr val="accent1">
-                    <a:hueOff val="-84091"/>
-                    <a:satOff val="15316"/>
-                    <a:lumOff val="24313"/>
-                  </a:schemeClr>
-                </a:solidFill>
-              </a:rPr>
-              <a:t>index</a:t>
-            </a:r>
-            <a:r>
-              <a:t>=“name”</a:t>
-            </a:r>
-          </a:p>
-          <a:p>
-            <a:pPr>
-              <a:defRPr sz="5100">
-                <a:latin typeface="Anonymous Pro for Powerline"/>
-                <a:ea typeface="Anonymous Pro for Powerline"/>
-                <a:cs typeface="Anonymous Pro for Powerline"/>
-                <a:sym typeface="Anonymous Pro for Powerline"/>
-              </a:defRPr>
-            </a:pPr>
-            <a:r>
-              <a:t>)</a:t>
-            </a:r>
-          </a:p>
-        </p:txBody>
-      </p:sp>
+        </p:spPr>
+      </p:pic>
     </p:spTree>
   </p:cSld>
   <p:clrMapOvr>
@@ -8537,7 +8452,7 @@
       </p:grpSpPr>
       <p:sp>
         <p:nvSpPr>
-          <p:cNvPr id="301" name="Shape 301"/>
+          <p:cNvPr id="295" name="Shape 295"/>
           <p:cNvSpPr/>
           <p:nvPr>
             <p:ph type="title"/>
@@ -8572,7 +8487,7 @@
       </p:sp>
       <p:sp>
         <p:nvSpPr>
-          <p:cNvPr id="302" name="Shape 302"/>
+          <p:cNvPr id="296" name="Shape 296"/>
           <p:cNvSpPr/>
           <p:nvPr/>
         </p:nvSpPr>
@@ -8664,7 +8579,7 @@
               <a:t>index</a:t>
             </a:r>
             <a:r>
-              <a:t>=“name”</a:t>
+              <a:t>=“name”,</a:t>
             </a:r>
           </a:p>
           <a:p>
@@ -8677,58 +8592,18 @@
               </a:defRPr>
             </a:pPr>
             <a:r>
-              <a:t>)</a:t>
-            </a:r>
-          </a:p>
-        </p:txBody>
-      </p:sp>
-      <p:sp>
-        <p:nvSpPr>
-          <p:cNvPr id="303" name="Shape 303"/>
-          <p:cNvSpPr/>
-          <p:nvPr/>
-        </p:nvSpPr>
-        <p:spPr>
-          <a:xfrm>
-            <a:off x="1561684" y="8029327"/>
-            <a:ext cx="9869488" cy="1079501"/>
-          </a:xfrm>
-          <a:prstGeom prst="rect">
-            <a:avLst/>
-          </a:prstGeom>
-          <a:ln w="12700">
-            <a:miter lim="400000"/>
-          </a:ln>
-          <a:extLst>
-            <a:ext uri="{C572A759-6A51-4108-AA02-DFA0A04FC94B}">
-              <ma14:wrappingTextBoxFlag xmlns:ma14="http://schemas.microsoft.com/office/mac/drawingml/2011/main" val="1"/>
-            </a:ext>
-          </a:extLst>
-        </p:spPr>
-        <p:txBody>
-          <a:bodyPr wrap="none" lIns="50800" tIns="50800" rIns="50800" bIns="50800" anchor="ctr">
-            <a:spAutoFit/>
-          </a:bodyPr>
-          <a:lstStyle>
-            <a:lvl1pPr>
-              <a:spcBef>
-                <a:spcPts val="2800"/>
-              </a:spcBef>
-              <a:defRPr sz="6400">
+              <a:t>    </a:t>
+            </a:r>
+            <a:r>
+              <a:rPr>
                 <a:solidFill>
-                  <a:schemeClr val="accent5"/>
+                  <a:schemeClr val="accent3"/>
                 </a:solidFill>
-                <a:latin typeface="Courier"/>
-                <a:ea typeface="Courier"/>
-                <a:cs typeface="Courier"/>
-                <a:sym typeface="Courier"/>
-              </a:defRPr>
-            </a:lvl1pPr>
-          </a:lstStyle>
-          <a:p>
-            <a:pPr/>
-            <a:r>
-              <a:t>takes AVG by default</a:t>
+              </a:rPr>
+              <a:t>columns</a:t>
+            </a:r>
+            <a:r>
+              <a:t>=“ABC”)</a:t>
             </a:r>
           </a:p>
         </p:txBody>
@@ -8759,1020 +8634,9 @@
           <a:chExt cx="0" cy="0"/>
         </a:xfrm>
       </p:grpSpPr>
-      <p:pic>
-        <p:nvPicPr>
-          <p:cNvPr id="305" name="pasted-image.tiff"/>
-          <p:cNvPicPr>
-            <a:picLocks noChangeAspect="1"/>
-          </p:cNvPicPr>
-          <p:nvPr/>
-        </p:nvPicPr>
-        <p:blipFill>
-          <a:blip r:embed="rId2">
-            <a:extLst/>
-          </a:blip>
-          <a:srcRect l="29888" t="0" r="0" b="0"/>
-          <a:stretch>
-            <a:fillRect/>
-          </a:stretch>
-        </p:blipFill>
-        <p:spPr>
-          <a:xfrm>
-            <a:off x="1152076" y="1891109"/>
-            <a:ext cx="6201518" cy="5971282"/>
-          </a:xfrm>
-          <a:prstGeom prst="rect">
-            <a:avLst/>
-          </a:prstGeom>
-          <a:ln w="12700">
-            <a:miter lim="400000"/>
-          </a:ln>
-        </p:spPr>
-      </p:pic>
-      <p:pic>
-        <p:nvPicPr>
-          <p:cNvPr id="306" name="pasted-image.tiff"/>
-          <p:cNvPicPr>
-            <a:picLocks noChangeAspect="1"/>
-          </p:cNvPicPr>
-          <p:nvPr/>
-        </p:nvPicPr>
-        <p:blipFill>
-          <a:blip r:embed="rId3">
-            <a:extLst/>
-          </a:blip>
-          <a:stretch>
-            <a:fillRect/>
-          </a:stretch>
-        </p:blipFill>
-        <p:spPr>
-          <a:xfrm>
-            <a:off x="7300845" y="1891159"/>
-            <a:ext cx="3936294" cy="5971282"/>
-          </a:xfrm>
-          <a:prstGeom prst="rect">
-            <a:avLst/>
-          </a:prstGeom>
-          <a:ln w="12700">
-            <a:miter lim="400000"/>
-          </a:ln>
-        </p:spPr>
-      </p:pic>
-      <p:sp>
-        <p:nvSpPr>
-          <p:cNvPr id="307" name="Shape 307"/>
-          <p:cNvSpPr/>
-          <p:nvPr/>
-        </p:nvSpPr>
-        <p:spPr>
-          <a:xfrm>
-            <a:off x="1183292" y="1906773"/>
-            <a:ext cx="6094544" cy="5940054"/>
-          </a:xfrm>
-          <a:prstGeom prst="rect">
-            <a:avLst/>
-          </a:prstGeom>
-          <a:solidFill>
-            <a:schemeClr val="accent1">
-              <a:alpha val="26647"/>
-            </a:schemeClr>
-          </a:solidFill>
-          <a:ln w="12700">
-            <a:miter lim="400000"/>
-          </a:ln>
-        </p:spPr>
-        <p:txBody>
-          <a:bodyPr lIns="50800" tIns="50800" rIns="50800" bIns="50800" anchor="ctr"/>
-          <a:lstStyle/>
-          <a:p>
-            <a:pPr algn="ctr">
-              <a:lnSpc>
-                <a:spcPct val="80000"/>
-              </a:lnSpc>
-              <a:spcBef>
-                <a:spcPts val="0"/>
-              </a:spcBef>
-              <a:defRPr cap="all" sz="2800">
-                <a:solidFill>
-                  <a:srgbClr val="FFFFFF"/>
-                </a:solidFill>
-                <a:latin typeface="+mn-lt"/>
-                <a:ea typeface="+mn-ea"/>
-                <a:cs typeface="+mn-cs"/>
-                <a:sym typeface="DIN Condensed"/>
-              </a:defRPr>
-            </a:pPr>
-          </a:p>
-        </p:txBody>
-      </p:sp>
-      <p:pic>
-        <p:nvPicPr>
-          <p:cNvPr id="308" name="pasted-image.tiff"/>
-          <p:cNvPicPr>
-            <a:picLocks noChangeAspect="1"/>
-          </p:cNvPicPr>
-          <p:nvPr/>
-        </p:nvPicPr>
-        <p:blipFill>
-          <a:blip r:embed="rId2">
-            <a:extLst/>
-          </a:blip>
-          <a:srcRect l="0" t="85" r="91816" b="85"/>
-          <a:stretch>
-            <a:fillRect/>
-          </a:stretch>
-        </p:blipFill>
-        <p:spPr>
-          <a:xfrm>
-            <a:off x="435270" y="1891109"/>
-            <a:ext cx="725095" cy="5971282"/>
-          </a:xfrm>
-          <a:prstGeom prst="rect">
-            <a:avLst/>
-          </a:prstGeom>
-          <a:ln w="12700">
-            <a:miter lim="400000"/>
-          </a:ln>
-        </p:spPr>
-      </p:pic>
-      <p:sp>
-        <p:nvSpPr>
-          <p:cNvPr id="309" name="Shape 309"/>
-          <p:cNvSpPr/>
-          <p:nvPr/>
-        </p:nvSpPr>
-        <p:spPr>
-          <a:xfrm>
-            <a:off x="7300845" y="1882450"/>
-            <a:ext cx="3936294" cy="5940054"/>
-          </a:xfrm>
-          <a:prstGeom prst="rect">
-            <a:avLst/>
-          </a:prstGeom>
-          <a:solidFill>
-            <a:srgbClr val="FDED10">
-              <a:alpha val="30000"/>
-            </a:srgbClr>
-          </a:solidFill>
-          <a:ln w="12700">
-            <a:miter lim="400000"/>
-          </a:ln>
-        </p:spPr>
-        <p:txBody>
-          <a:bodyPr lIns="50800" tIns="50800" rIns="50800" bIns="50800" anchor="ctr"/>
-          <a:lstStyle/>
-          <a:p>
-            <a:pPr algn="ctr">
-              <a:lnSpc>
-                <a:spcPct val="80000"/>
-              </a:lnSpc>
-              <a:spcBef>
-                <a:spcPts val="0"/>
-              </a:spcBef>
-              <a:defRPr cap="all" sz="2800">
-                <a:solidFill>
-                  <a:srgbClr val="232323"/>
-                </a:solidFill>
-                <a:latin typeface="+mn-lt"/>
-                <a:ea typeface="+mn-ea"/>
-                <a:cs typeface="+mn-cs"/>
-                <a:sym typeface="DIN Condensed"/>
-              </a:defRPr>
-            </a:pPr>
-          </a:p>
-        </p:txBody>
-      </p:sp>
-    </p:spTree>
-  </p:cSld>
-  <p:clrMapOvr>
-    <a:masterClrMapping/>
-  </p:clrMapOvr>
-  <p:transition xmlns:p14="http://schemas.microsoft.com/office/powerpoint/2010/main" spd="med" advClick="1"/>
-</p:sld>
-</file>
-
-<file path=ppt/slides/slide33.xml><?xml version="1.0" encoding="utf-8"?>
-<p:sld xmlns:a="http://schemas.openxmlformats.org/drawingml/2006/main" xmlns:r="http://schemas.openxmlformats.org/officeDocument/2006/relationships" xmlns:p="http://schemas.openxmlformats.org/presentationml/2006/main" showMasterSp="1" showMasterPhAnim="1">
-  <p:cSld>
-    <p:spTree>
-      <p:nvGrpSpPr>
-        <p:cNvPr id="1" name=""/>
-        <p:cNvGrpSpPr/>
-        <p:nvPr/>
-      </p:nvGrpSpPr>
-      <p:grpSpPr>
-        <a:xfrm>
-          <a:off x="0" y="0"/>
-          <a:ext cx="0" cy="0"/>
-          <a:chOff x="0" y="0"/>
-          <a:chExt cx="0" cy="0"/>
-        </a:xfrm>
-      </p:grpSpPr>
-      <p:pic>
-        <p:nvPicPr>
-          <p:cNvPr id="311" name="pasted-image.tiff"/>
-          <p:cNvPicPr>
-            <a:picLocks noChangeAspect="1"/>
-          </p:cNvPicPr>
-          <p:nvPr/>
-        </p:nvPicPr>
-        <p:blipFill>
-          <a:blip r:embed="rId2">
-            <a:extLst/>
-          </a:blip>
-          <a:stretch>
-            <a:fillRect/>
-          </a:stretch>
-        </p:blipFill>
-        <p:spPr>
-          <a:xfrm>
-            <a:off x="950544" y="2251320"/>
-            <a:ext cx="4717139" cy="6254354"/>
-          </a:xfrm>
-          <a:prstGeom prst="rect">
-            <a:avLst/>
-          </a:prstGeom>
-          <a:ln w="12700">
-            <a:miter lim="400000"/>
-          </a:ln>
-        </p:spPr>
-      </p:pic>
-      <p:pic>
-        <p:nvPicPr>
-          <p:cNvPr id="312" name="pasted-image.tiff"/>
-          <p:cNvPicPr>
-            <a:picLocks noChangeAspect="1"/>
-          </p:cNvPicPr>
-          <p:nvPr/>
-        </p:nvPicPr>
-        <p:blipFill>
-          <a:blip r:embed="rId3">
-            <a:extLst/>
-          </a:blip>
-          <a:srcRect l="30967" t="0" r="0" b="0"/>
-          <a:stretch>
-            <a:fillRect/>
-          </a:stretch>
-        </p:blipFill>
-        <p:spPr>
-          <a:xfrm>
-            <a:off x="5666273" y="2270370"/>
-            <a:ext cx="6716327" cy="6254477"/>
-          </a:xfrm>
-          <a:prstGeom prst="rect">
-            <a:avLst/>
-          </a:prstGeom>
-          <a:ln w="12700">
-            <a:miter lim="400000"/>
-          </a:ln>
-        </p:spPr>
-      </p:pic>
-      <p:sp>
-        <p:nvSpPr>
-          <p:cNvPr id="313" name="Shape 313"/>
-          <p:cNvSpPr/>
-          <p:nvPr/>
-        </p:nvSpPr>
-        <p:spPr>
-          <a:xfrm>
-            <a:off x="955646" y="2270370"/>
-            <a:ext cx="4706935" cy="6254354"/>
-          </a:xfrm>
-          <a:prstGeom prst="rect">
-            <a:avLst/>
-          </a:prstGeom>
-          <a:solidFill>
-            <a:schemeClr val="accent1">
-              <a:alpha val="26647"/>
-            </a:schemeClr>
-          </a:solidFill>
-          <a:ln w="12700">
-            <a:miter lim="400000"/>
-          </a:ln>
-        </p:spPr>
-        <p:txBody>
-          <a:bodyPr lIns="50800" tIns="50800" rIns="50800" bIns="50800" anchor="ctr"/>
-          <a:lstStyle/>
-          <a:p>
-            <a:pPr algn="ctr">
-              <a:lnSpc>
-                <a:spcPct val="80000"/>
-              </a:lnSpc>
-              <a:spcBef>
-                <a:spcPts val="0"/>
-              </a:spcBef>
-              <a:defRPr cap="all" sz="2800">
-                <a:solidFill>
-                  <a:srgbClr val="FFFFFF"/>
-                </a:solidFill>
-                <a:latin typeface="+mn-lt"/>
-                <a:ea typeface="+mn-ea"/>
-                <a:cs typeface="+mn-cs"/>
-                <a:sym typeface="DIN Condensed"/>
-              </a:defRPr>
-            </a:pPr>
-          </a:p>
-        </p:txBody>
-      </p:sp>
-      <p:sp>
-        <p:nvSpPr>
-          <p:cNvPr id="314" name="Shape 314"/>
-          <p:cNvSpPr/>
-          <p:nvPr/>
-        </p:nvSpPr>
-        <p:spPr>
-          <a:xfrm>
-            <a:off x="5646868" y="2247298"/>
-            <a:ext cx="6716317" cy="6262398"/>
-          </a:xfrm>
-          <a:prstGeom prst="rect">
-            <a:avLst/>
-          </a:prstGeom>
-          <a:solidFill>
-            <a:srgbClr val="FDED10">
-              <a:alpha val="30000"/>
-            </a:srgbClr>
-          </a:solidFill>
-          <a:ln w="12700">
-            <a:miter lim="400000"/>
-          </a:ln>
-        </p:spPr>
-        <p:txBody>
-          <a:bodyPr lIns="50800" tIns="50800" rIns="50800" bIns="50800" anchor="ctr"/>
-          <a:lstStyle/>
-          <a:p>
-            <a:pPr algn="ctr">
-              <a:lnSpc>
-                <a:spcPct val="80000"/>
-              </a:lnSpc>
-              <a:spcBef>
-                <a:spcPts val="0"/>
-              </a:spcBef>
-              <a:defRPr cap="all" sz="2800">
-                <a:solidFill>
-                  <a:srgbClr val="232323"/>
-                </a:solidFill>
-                <a:latin typeface="+mn-lt"/>
-                <a:ea typeface="+mn-ea"/>
-                <a:cs typeface="+mn-cs"/>
-                <a:sym typeface="DIN Condensed"/>
-              </a:defRPr>
-            </a:pPr>
-          </a:p>
-        </p:txBody>
-      </p:sp>
-    </p:spTree>
-  </p:cSld>
-  <p:clrMapOvr>
-    <a:masterClrMapping/>
-  </p:clrMapOvr>
-  <p:transition xmlns:p14="http://schemas.microsoft.com/office/powerpoint/2010/main" spd="med" advClick="1"/>
-</p:sld>
-</file>
-
-<file path=ppt/slides/slide34.xml><?xml version="1.0" encoding="utf-8"?>
-<p:sld xmlns:a="http://schemas.openxmlformats.org/drawingml/2006/main" xmlns:r="http://schemas.openxmlformats.org/officeDocument/2006/relationships" xmlns:p="http://schemas.openxmlformats.org/presentationml/2006/main" showMasterSp="1" showMasterPhAnim="1">
-  <p:cSld>
-    <p:spTree>
-      <p:nvGrpSpPr>
-        <p:cNvPr id="1" name=""/>
-        <p:cNvGrpSpPr/>
-        <p:nvPr/>
-      </p:nvGrpSpPr>
-      <p:grpSpPr>
-        <a:xfrm>
-          <a:off x="0" y="0"/>
-          <a:ext cx="0" cy="0"/>
-          <a:chOff x="0" y="0"/>
-          <a:chExt cx="0" cy="0"/>
-        </a:xfrm>
-      </p:grpSpPr>
-      <p:sp>
-        <p:nvSpPr>
-          <p:cNvPr id="316" name="Shape 316"/>
-          <p:cNvSpPr/>
-          <p:nvPr>
-            <p:ph type="title"/>
-          </p:nvPr>
-        </p:nvSpPr>
-        <p:spPr>
-          <a:xfrm>
-            <a:off x="406400" y="1536700"/>
-            <a:ext cx="12192000" cy="1169260"/>
-          </a:xfrm>
-          <a:prstGeom prst="rect">
-            <a:avLst/>
-          </a:prstGeom>
-        </p:spPr>
-        <p:txBody>
-          <a:bodyPr/>
-          <a:lstStyle>
-            <a:lvl1pPr defTabSz="403097">
-              <a:spcBef>
-                <a:spcPts val="1900"/>
-              </a:spcBef>
-              <a:defRPr sz="8280"/>
-            </a:lvl1pPr>
-          </a:lstStyle>
-          <a:p>
-            <a:pPr/>
-            <a:r>
-              <a:t>Pivot table syntax</a:t>
-            </a:r>
-          </a:p>
-        </p:txBody>
-      </p:sp>
-      <p:sp>
-        <p:nvSpPr>
-          <p:cNvPr id="317" name="Shape 317"/>
-          <p:cNvSpPr/>
-          <p:nvPr/>
-        </p:nvSpPr>
-        <p:spPr>
-          <a:xfrm>
-            <a:off x="434394" y="3206749"/>
-            <a:ext cx="12946701" cy="5194301"/>
-          </a:xfrm>
-          <a:prstGeom prst="rect">
-            <a:avLst/>
-          </a:prstGeom>
-          <a:ln w="12700">
-            <a:miter lim="400000"/>
-          </a:ln>
-          <a:extLst>
-            <a:ext uri="{C572A759-6A51-4108-AA02-DFA0A04FC94B}">
-              <ma14:wrappingTextBoxFlag xmlns:ma14="http://schemas.microsoft.com/office/mac/drawingml/2011/main" val="1"/>
-            </a:ext>
-          </a:extLst>
-        </p:spPr>
-        <p:txBody>
-          <a:bodyPr lIns="50800" tIns="50800" rIns="50800" bIns="50800" anchor="ctr">
-            <a:spAutoFit/>
-          </a:bodyPr>
-          <a:lstStyle/>
-          <a:p>
-            <a:pPr>
-              <a:defRPr sz="5100">
-                <a:latin typeface="Anonymous Pro for Powerline"/>
-                <a:ea typeface="Anonymous Pro for Powerline"/>
-                <a:cs typeface="Anonymous Pro for Powerline"/>
-                <a:sym typeface="Anonymous Pro for Powerline"/>
-              </a:defRPr>
-            </a:pPr>
-            <a:r>
-              <a:t>sales_df.pivot_table(</a:t>
-            </a:r>
-          </a:p>
-          <a:p>
-            <a:pPr>
-              <a:defRPr sz="5100">
-                <a:latin typeface="Anonymous Pro for Powerline"/>
-                <a:ea typeface="Anonymous Pro for Powerline"/>
-                <a:cs typeface="Anonymous Pro for Powerline"/>
-                <a:sym typeface="Anonymous Pro for Powerline"/>
-              </a:defRPr>
-            </a:pPr>
-            <a:r>
-              <a:t>    </a:t>
-            </a:r>
-            <a:r>
-              <a:rPr>
-                <a:solidFill>
-                  <a:schemeClr val="accent4">
-                    <a:hueOff val="414058"/>
-                    <a:satOff val="2144"/>
-                    <a:lumOff val="10379"/>
-                  </a:schemeClr>
-                </a:solidFill>
-              </a:rPr>
-              <a:t>values</a:t>
-            </a:r>
-            <a:r>
-              <a:t>=[“quantity”,”price”],</a:t>
-            </a:r>
-          </a:p>
-          <a:p>
-            <a:pPr>
-              <a:defRPr sz="5100">
-                <a:latin typeface="Anonymous Pro for Powerline"/>
-                <a:ea typeface="Anonymous Pro for Powerline"/>
-                <a:cs typeface="Anonymous Pro for Powerline"/>
-                <a:sym typeface="Anonymous Pro for Powerline"/>
-              </a:defRPr>
-            </a:pPr>
-            <a:r>
-              <a:t>    </a:t>
-            </a:r>
-            <a:r>
-              <a:rPr>
-                <a:solidFill>
-                  <a:schemeClr val="accent1">
-                    <a:hueOff val="-84091"/>
-                    <a:satOff val="15316"/>
-                    <a:lumOff val="24313"/>
-                  </a:schemeClr>
-                </a:solidFill>
-              </a:rPr>
-              <a:t>index</a:t>
-            </a:r>
-            <a:r>
-              <a:t>=“name”,</a:t>
-            </a:r>
-          </a:p>
-          <a:p>
-            <a:pPr>
-              <a:defRPr sz="5100">
-                <a:latin typeface="Anonymous Pro for Powerline"/>
-                <a:ea typeface="Anonymous Pro for Powerline"/>
-                <a:cs typeface="Anonymous Pro for Powerline"/>
-                <a:sym typeface="Anonymous Pro for Powerline"/>
-              </a:defRPr>
-            </a:pPr>
-            <a:r>
-              <a:t>    </a:t>
-            </a:r>
-            <a:r>
-              <a:rPr>
-                <a:solidFill>
-                  <a:schemeClr val="accent5"/>
-                </a:solidFill>
-              </a:rPr>
-              <a:t>aggfunc</a:t>
-            </a:r>
-            <a:r>
-              <a:t>=“sum”</a:t>
-            </a:r>
-          </a:p>
-          <a:p>
-            <a:pPr>
-              <a:defRPr sz="5100">
-                <a:latin typeface="Anonymous Pro for Powerline"/>
-                <a:ea typeface="Anonymous Pro for Powerline"/>
-                <a:cs typeface="Anonymous Pro for Powerline"/>
-                <a:sym typeface="Anonymous Pro for Powerline"/>
-              </a:defRPr>
-            </a:pPr>
-            <a:r>
-              <a:t>)</a:t>
-            </a:r>
-          </a:p>
-        </p:txBody>
-      </p:sp>
-    </p:spTree>
-  </p:cSld>
-  <p:clrMapOvr>
-    <a:masterClrMapping/>
-  </p:clrMapOvr>
-  <p:transition xmlns:p14="http://schemas.microsoft.com/office/powerpoint/2010/main" spd="med" advClick="1"/>
-</p:sld>
-</file>
-
-<file path=ppt/slides/slide35.xml><?xml version="1.0" encoding="utf-8"?>
-<p:sld xmlns:a="http://schemas.openxmlformats.org/drawingml/2006/main" xmlns:r="http://schemas.openxmlformats.org/officeDocument/2006/relationships" xmlns:p="http://schemas.openxmlformats.org/presentationml/2006/main" showMasterSp="1" showMasterPhAnim="1">
-  <p:cSld>
-    <p:spTree>
-      <p:nvGrpSpPr>
-        <p:cNvPr id="1" name=""/>
-        <p:cNvGrpSpPr/>
-        <p:nvPr/>
-      </p:nvGrpSpPr>
-      <p:grpSpPr>
-        <a:xfrm>
-          <a:off x="0" y="0"/>
-          <a:ext cx="0" cy="0"/>
-          <a:chOff x="0" y="0"/>
-          <a:chExt cx="0" cy="0"/>
-        </a:xfrm>
-      </p:grpSpPr>
-      <p:sp>
-        <p:nvSpPr>
-          <p:cNvPr id="319" name="Shape 319"/>
-          <p:cNvSpPr/>
-          <p:nvPr>
-            <p:ph type="title"/>
-          </p:nvPr>
-        </p:nvSpPr>
-        <p:spPr>
-          <a:xfrm>
-            <a:off x="2595467" y="4055489"/>
-            <a:ext cx="7813866" cy="1982355"/>
-          </a:xfrm>
-          <a:prstGeom prst="rect">
-            <a:avLst/>
-          </a:prstGeom>
-        </p:spPr>
-        <p:txBody>
-          <a:bodyPr/>
-          <a:lstStyle>
-            <a:lvl1pPr defTabSz="368045">
-              <a:defRPr sz="10710"/>
-            </a:lvl1pPr>
-          </a:lstStyle>
-          <a:p>
-            <a:pPr/>
-            <a:r>
-              <a:t>Beyond Groupby</a:t>
-            </a:r>
-          </a:p>
-        </p:txBody>
-      </p:sp>
-    </p:spTree>
-  </p:cSld>
-  <p:clrMapOvr>
-    <a:masterClrMapping/>
-  </p:clrMapOvr>
-  <p:transition xmlns:p14="http://schemas.microsoft.com/office/powerpoint/2010/main" spd="med" advClick="1"/>
-</p:sld>
-</file>
-
-<file path=ppt/slides/slide36.xml><?xml version="1.0" encoding="utf-8"?>
-<p:sld xmlns:a="http://schemas.openxmlformats.org/drawingml/2006/main" xmlns:r="http://schemas.openxmlformats.org/officeDocument/2006/relationships" xmlns:p="http://schemas.openxmlformats.org/presentationml/2006/main" showMasterSp="1" showMasterPhAnim="1">
-  <p:cSld>
-    <p:spTree>
-      <p:nvGrpSpPr>
-        <p:cNvPr id="1" name=""/>
-        <p:cNvGrpSpPr/>
-        <p:nvPr/>
-      </p:nvGrpSpPr>
-      <p:grpSpPr>
-        <a:xfrm>
-          <a:off x="0" y="0"/>
-          <a:ext cx="0" cy="0"/>
-          <a:chOff x="0" y="0"/>
-          <a:chExt cx="0" cy="0"/>
-        </a:xfrm>
-      </p:grpSpPr>
-      <p:sp>
-        <p:nvSpPr>
-          <p:cNvPr id="321" name="Shape 321"/>
-          <p:cNvSpPr/>
-          <p:nvPr>
-            <p:ph type="title"/>
-          </p:nvPr>
-        </p:nvSpPr>
-        <p:spPr>
-          <a:xfrm>
-            <a:off x="406400" y="1536700"/>
-            <a:ext cx="12192000" cy="1169261"/>
-          </a:xfrm>
-          <a:prstGeom prst="rect">
-            <a:avLst/>
-          </a:prstGeom>
-        </p:spPr>
-        <p:txBody>
-          <a:bodyPr/>
-          <a:lstStyle>
-            <a:lvl1pPr defTabSz="403097">
-              <a:spcBef>
-                <a:spcPts val="1900"/>
-              </a:spcBef>
-              <a:defRPr sz="8200"/>
-            </a:lvl1pPr>
-          </a:lstStyle>
-          <a:p>
-            <a:pPr/>
-            <a:r>
-              <a:t>Columns</a:t>
-            </a:r>
-          </a:p>
-        </p:txBody>
-      </p:sp>
-      <p:sp>
-        <p:nvSpPr>
-          <p:cNvPr id="322" name="Shape 322"/>
-          <p:cNvSpPr/>
-          <p:nvPr>
-            <p:ph type="body" idx="1"/>
-          </p:nvPr>
-        </p:nvSpPr>
-        <p:spPr>
-          <a:xfrm>
-            <a:off x="406400" y="3953767"/>
-            <a:ext cx="12192000" cy="5463876"/>
-          </a:xfrm>
-          <a:prstGeom prst="rect">
-            <a:avLst/>
-          </a:prstGeom>
-        </p:spPr>
-        <p:txBody>
-          <a:bodyPr anchor="t"/>
-          <a:lstStyle/>
-          <a:p>
-            <a:pPr marL="614194" indent="-614194" defTabSz="508254">
-              <a:lnSpc>
-                <a:spcPct val="100000"/>
-              </a:lnSpc>
-              <a:spcBef>
-                <a:spcPts val="2400"/>
-              </a:spcBef>
-              <a:buSzPct val="40000"/>
-              <a:buBlip>
-                <a:blip r:embed="rId2"/>
-              </a:buBlip>
-              <a:defRPr cap="none" spc="0" sz="5500">
-                <a:latin typeface="Avenir Next Medium"/>
-                <a:ea typeface="Avenir Next Medium"/>
-                <a:cs typeface="Avenir Next Medium"/>
-                <a:sym typeface="Avenir Next Medium"/>
-              </a:defRPr>
-            </a:pPr>
-            <a:r>
-              <a:t>Columns segment values, just like index</a:t>
-            </a:r>
-          </a:p>
-          <a:p>
-            <a:pPr marL="614194" indent="-614194" defTabSz="508254">
-              <a:lnSpc>
-                <a:spcPct val="100000"/>
-              </a:lnSpc>
-              <a:spcBef>
-                <a:spcPts val="2400"/>
-              </a:spcBef>
-              <a:buSzPct val="40000"/>
-              <a:buBlip>
-                <a:blip r:embed="rId2"/>
-              </a:buBlip>
-              <a:defRPr cap="none" spc="0" sz="5500">
-                <a:latin typeface="Avenir Next Medium"/>
-                <a:ea typeface="Avenir Next Medium"/>
-                <a:cs typeface="Avenir Next Medium"/>
-                <a:sym typeface="Avenir Next Medium"/>
-              </a:defRPr>
-            </a:pPr>
-            <a:r>
-              <a:t>Will form bins from unique values in column you specify</a:t>
-            </a:r>
-          </a:p>
-        </p:txBody>
-      </p:sp>
-    </p:spTree>
-  </p:cSld>
-  <p:clrMapOvr>
-    <a:masterClrMapping/>
-  </p:clrMapOvr>
-  <p:transition xmlns:p14="http://schemas.microsoft.com/office/powerpoint/2010/main" spd="med" advClick="1"/>
-</p:sld>
-</file>
-
-<file path=ppt/slides/slide37.xml><?xml version="1.0" encoding="utf-8"?>
-<p:sld xmlns:a="http://schemas.openxmlformats.org/drawingml/2006/main" xmlns:r="http://schemas.openxmlformats.org/officeDocument/2006/relationships" xmlns:p="http://schemas.openxmlformats.org/presentationml/2006/main" showMasterSp="1" showMasterPhAnim="1">
-  <p:cSld>
-    <p:spTree>
-      <p:nvGrpSpPr>
-        <p:cNvPr id="1" name=""/>
-        <p:cNvGrpSpPr/>
-        <p:nvPr/>
-      </p:nvGrpSpPr>
-      <p:grpSpPr>
-        <a:xfrm>
-          <a:off x="0" y="0"/>
-          <a:ext cx="0" cy="0"/>
-          <a:chOff x="0" y="0"/>
-          <a:chExt cx="0" cy="0"/>
-        </a:xfrm>
-      </p:grpSpPr>
-      <p:pic>
-        <p:nvPicPr>
-          <p:cNvPr id="324" name="pasted-image.png"/>
-          <p:cNvPicPr>
-            <a:picLocks noChangeAspect="1"/>
-          </p:cNvPicPr>
-          <p:nvPr/>
-        </p:nvPicPr>
-        <p:blipFill>
-          <a:blip r:embed="rId2">
-            <a:extLst/>
-          </a:blip>
-          <a:stretch>
-            <a:fillRect/>
-          </a:stretch>
-        </p:blipFill>
-        <p:spPr>
-          <a:xfrm>
-            <a:off x="20873" y="1540407"/>
-            <a:ext cx="13004801" cy="6694275"/>
-          </a:xfrm>
-          <a:prstGeom prst="rect">
-            <a:avLst/>
-          </a:prstGeom>
-          <a:ln w="12700">
-            <a:miter lim="400000"/>
-          </a:ln>
-        </p:spPr>
-      </p:pic>
-    </p:spTree>
-  </p:cSld>
-  <p:clrMapOvr>
-    <a:masterClrMapping/>
-  </p:clrMapOvr>
-  <p:transition xmlns:p14="http://schemas.microsoft.com/office/powerpoint/2010/main" spd="med" advClick="1"/>
-</p:sld>
-</file>
-
-<file path=ppt/slides/slide38.xml><?xml version="1.0" encoding="utf-8"?>
-<p:sld xmlns:a="http://schemas.openxmlformats.org/drawingml/2006/main" xmlns:r="http://schemas.openxmlformats.org/officeDocument/2006/relationships" xmlns:p="http://schemas.openxmlformats.org/presentationml/2006/main" showMasterSp="1" showMasterPhAnim="1">
-  <p:cSld>
-    <p:spTree>
-      <p:nvGrpSpPr>
-        <p:cNvPr id="1" name=""/>
-        <p:cNvGrpSpPr/>
-        <p:nvPr/>
-      </p:nvGrpSpPr>
-      <p:grpSpPr>
-        <a:xfrm>
-          <a:off x="0" y="0"/>
-          <a:ext cx="0" cy="0"/>
-          <a:chOff x="0" y="0"/>
-          <a:chExt cx="0" cy="0"/>
-        </a:xfrm>
-      </p:grpSpPr>
-      <p:sp>
-        <p:nvSpPr>
-          <p:cNvPr id="326" name="Shape 326"/>
-          <p:cNvSpPr/>
-          <p:nvPr>
-            <p:ph type="title"/>
-          </p:nvPr>
-        </p:nvSpPr>
-        <p:spPr>
-          <a:xfrm>
-            <a:off x="406400" y="1536700"/>
-            <a:ext cx="12192000" cy="1169260"/>
-          </a:xfrm>
-          <a:prstGeom prst="rect">
-            <a:avLst/>
-          </a:prstGeom>
-        </p:spPr>
-        <p:txBody>
-          <a:bodyPr/>
-          <a:lstStyle>
-            <a:lvl1pPr defTabSz="403097">
-              <a:spcBef>
-                <a:spcPts val="1900"/>
-              </a:spcBef>
-              <a:defRPr sz="8280"/>
-            </a:lvl1pPr>
-          </a:lstStyle>
-          <a:p>
-            <a:pPr/>
-            <a:r>
-              <a:t>Pivot table syntax</a:t>
-            </a:r>
-          </a:p>
-        </p:txBody>
-      </p:sp>
-      <p:sp>
-        <p:nvSpPr>
-          <p:cNvPr id="327" name="Shape 327"/>
-          <p:cNvSpPr/>
-          <p:nvPr/>
-        </p:nvSpPr>
-        <p:spPr>
-          <a:xfrm>
-            <a:off x="434394" y="3746499"/>
-            <a:ext cx="12946701" cy="4114801"/>
-          </a:xfrm>
-          <a:prstGeom prst="rect">
-            <a:avLst/>
-          </a:prstGeom>
-          <a:ln w="12700">
-            <a:miter lim="400000"/>
-          </a:ln>
-          <a:extLst>
-            <a:ext uri="{C572A759-6A51-4108-AA02-DFA0A04FC94B}">
-              <ma14:wrappingTextBoxFlag xmlns:ma14="http://schemas.microsoft.com/office/mac/drawingml/2011/main" val="1"/>
-            </a:ext>
-          </a:extLst>
-        </p:spPr>
-        <p:txBody>
-          <a:bodyPr lIns="50800" tIns="50800" rIns="50800" bIns="50800" anchor="ctr">
-            <a:spAutoFit/>
-          </a:bodyPr>
-          <a:lstStyle/>
-          <a:p>
-            <a:pPr>
-              <a:defRPr sz="5100">
-                <a:latin typeface="Anonymous Pro for Powerline"/>
-                <a:ea typeface="Anonymous Pro for Powerline"/>
-                <a:cs typeface="Anonymous Pro for Powerline"/>
-                <a:sym typeface="Anonymous Pro for Powerline"/>
-              </a:defRPr>
-            </a:pPr>
-            <a:r>
-              <a:t>sales_df.pivot_table(</a:t>
-            </a:r>
-          </a:p>
-          <a:p>
-            <a:pPr>
-              <a:defRPr sz="5100">
-                <a:latin typeface="Anonymous Pro for Powerline"/>
-                <a:ea typeface="Anonymous Pro for Powerline"/>
-                <a:cs typeface="Anonymous Pro for Powerline"/>
-                <a:sym typeface="Anonymous Pro for Powerline"/>
-              </a:defRPr>
-            </a:pPr>
-            <a:r>
-              <a:t>    </a:t>
-            </a:r>
-            <a:r>
-              <a:rPr>
-                <a:solidFill>
-                  <a:schemeClr val="accent4">
-                    <a:hueOff val="414058"/>
-                    <a:satOff val="2144"/>
-                    <a:lumOff val="10379"/>
-                  </a:schemeClr>
-                </a:solidFill>
-              </a:rPr>
-              <a:t>values</a:t>
-            </a:r>
-            <a:r>
-              <a:t>=[“quantity”,”price”],</a:t>
-            </a:r>
-          </a:p>
-          <a:p>
-            <a:pPr>
-              <a:defRPr sz="5100">
-                <a:latin typeface="Anonymous Pro for Powerline"/>
-                <a:ea typeface="Anonymous Pro for Powerline"/>
-                <a:cs typeface="Anonymous Pro for Powerline"/>
-                <a:sym typeface="Anonymous Pro for Powerline"/>
-              </a:defRPr>
-            </a:pPr>
-            <a:r>
-              <a:t>    </a:t>
-            </a:r>
-            <a:r>
-              <a:rPr>
-                <a:solidFill>
-                  <a:schemeClr val="accent1">
-                    <a:hueOff val="-84091"/>
-                    <a:satOff val="15316"/>
-                    <a:lumOff val="24313"/>
-                  </a:schemeClr>
-                </a:solidFill>
-              </a:rPr>
-              <a:t>index</a:t>
-            </a:r>
-            <a:r>
-              <a:t>=“name”,</a:t>
-            </a:r>
-          </a:p>
-          <a:p>
-            <a:pPr>
-              <a:defRPr sz="5100">
-                <a:latin typeface="Anonymous Pro for Powerline"/>
-                <a:ea typeface="Anonymous Pro for Powerline"/>
-                <a:cs typeface="Anonymous Pro for Powerline"/>
-                <a:sym typeface="Anonymous Pro for Powerline"/>
-              </a:defRPr>
-            </a:pPr>
-            <a:r>
-              <a:t>    </a:t>
-            </a:r>
-            <a:r>
-              <a:rPr>
-                <a:solidFill>
-                  <a:schemeClr val="accent3"/>
-                </a:solidFill>
-              </a:rPr>
-              <a:t>columns</a:t>
-            </a:r>
-            <a:r>
-              <a:t>=“ABC”)</a:t>
-            </a:r>
-          </a:p>
-        </p:txBody>
-      </p:sp>
-    </p:spTree>
-  </p:cSld>
-  <p:clrMapOvr>
-    <a:masterClrMapping/>
-  </p:clrMapOvr>
-  <p:transition xmlns:p14="http://schemas.microsoft.com/office/powerpoint/2010/main" spd="med" advClick="1"/>
-</p:sld>
-</file>
-
-<file path=ppt/slides/slide39.xml><?xml version="1.0" encoding="utf-8"?>
-<p:sld xmlns:a="http://schemas.openxmlformats.org/drawingml/2006/main" xmlns:r="http://schemas.openxmlformats.org/officeDocument/2006/relationships" xmlns:p="http://schemas.openxmlformats.org/presentationml/2006/main" showMasterSp="1" showMasterPhAnim="1">
-  <p:cSld>
-    <p:spTree>
-      <p:nvGrpSpPr>
-        <p:cNvPr id="1" name=""/>
-        <p:cNvGrpSpPr/>
-        <p:nvPr/>
-      </p:nvGrpSpPr>
-      <p:grpSpPr>
-        <a:xfrm>
-          <a:off x="0" y="0"/>
-          <a:ext cx="0" cy="0"/>
-          <a:chOff x="0" y="0"/>
-          <a:chExt cx="0" cy="0"/>
-        </a:xfrm>
-      </p:grpSpPr>
-      <p:sp>
-        <p:nvSpPr>
-          <p:cNvPr id="329" name="Shape 329"/>
+      <p:sp>
+        <p:nvSpPr>
+          <p:cNvPr id="298" name="Shape 298"/>
           <p:cNvSpPr/>
           <p:nvPr>
             <p:ph type="title"/>
@@ -9858,7 +8722,7 @@
           <a:p>
             <a:pPr/>
             <a:r>
-              <a:t>creating a Dataframe</a:t>
+              <a:t>Dataframe from Excel</a:t>
             </a:r>
           </a:p>
         </p:txBody>
@@ -9871,8 +8735,8 @@
         </p:nvSpPr>
         <p:spPr>
           <a:xfrm>
-            <a:off x="176491" y="4826000"/>
-            <a:ext cx="13004801" cy="1955801"/>
+            <a:off x="455296" y="4286249"/>
+            <a:ext cx="12192002" cy="3035301"/>
           </a:xfrm>
           <a:prstGeom prst="rect">
             <a:avLst/>
@@ -9901,7 +8765,7 @@
               </a:defRPr>
             </a:pPr>
             <a:r>
-              <a:t>new_df = pd.read_csv(“path_to_file”)</a:t>
+              <a:t>pd.read_excel(“path_to_file”,</a:t>
             </a:r>
           </a:p>
           <a:p>
@@ -9914,7 +8778,112 @@
               </a:defRPr>
             </a:pPr>
             <a:r>
+              <a:t>               sheet_name=None)</a:t>
+            </a:r>
+          </a:p>
+          <a:p>
+            <a:pPr>
+              <a:defRPr sz="5100">
+                <a:latin typeface="Anonymous Pro for Powerline"/>
+                <a:ea typeface="Anonymous Pro for Powerline"/>
+                <a:cs typeface="Anonymous Pro for Powerline"/>
+                <a:sym typeface="Anonymous Pro for Powerline"/>
+              </a:defRPr>
+            </a:pPr>
+            <a:r>
               <a:t> </a:t>
+            </a:r>
+          </a:p>
+        </p:txBody>
+      </p:sp>
+      <p:sp>
+        <p:nvSpPr>
+          <p:cNvPr id="213" name="Shape 213"/>
+          <p:cNvSpPr/>
+          <p:nvPr/>
+        </p:nvSpPr>
+        <p:spPr>
+          <a:xfrm rot="21591301">
+            <a:off x="585310" y="7316851"/>
+            <a:ext cx="1620784" cy="518251"/>
+          </a:xfrm>
+          <a:prstGeom prst="rightArrow">
+            <a:avLst>
+              <a:gd name="adj1" fmla="val 34174"/>
+              <a:gd name="adj2" fmla="val 145948"/>
+            </a:avLst>
+          </a:prstGeom>
+          <a:solidFill>
+            <a:schemeClr val="accent5"/>
+          </a:solidFill>
+          <a:ln w="12700">
+            <a:miter lim="400000"/>
+          </a:ln>
+        </p:spPr>
+        <p:txBody>
+          <a:bodyPr lIns="50800" tIns="50800" rIns="50800" bIns="50800" anchor="ctr"/>
+          <a:lstStyle/>
+          <a:p>
+            <a:pPr algn="ctr">
+              <a:lnSpc>
+                <a:spcPct val="80000"/>
+              </a:lnSpc>
+              <a:spcBef>
+                <a:spcPts val="0"/>
+              </a:spcBef>
+              <a:defRPr cap="all" sz="2800">
+                <a:solidFill>
+                  <a:srgbClr val="FFFFFF"/>
+                </a:solidFill>
+                <a:latin typeface="+mn-lt"/>
+                <a:ea typeface="+mn-ea"/>
+                <a:cs typeface="+mn-cs"/>
+                <a:sym typeface="DIN Condensed"/>
+              </a:defRPr>
+            </a:pPr>
+          </a:p>
+        </p:txBody>
+      </p:sp>
+      <p:sp>
+        <p:nvSpPr>
+          <p:cNvPr id="214" name="Shape 214"/>
+          <p:cNvSpPr/>
+          <p:nvPr/>
+        </p:nvSpPr>
+        <p:spPr>
+          <a:xfrm>
+            <a:off x="2405602" y="7004339"/>
+            <a:ext cx="8057389" cy="1143001"/>
+          </a:xfrm>
+          <a:prstGeom prst="rect">
+            <a:avLst/>
+          </a:prstGeom>
+          <a:ln w="12700">
+            <a:miter lim="400000"/>
+          </a:ln>
+          <a:extLst>
+            <a:ext uri="{C572A759-6A51-4108-AA02-DFA0A04FC94B}">
+              <ma14:wrappingTextBoxFlag xmlns:ma14="http://schemas.microsoft.com/office/mac/drawingml/2011/main" val="1"/>
+            </a:ext>
+          </a:extLst>
+        </p:spPr>
+        <p:txBody>
+          <a:bodyPr wrap="none" lIns="50800" tIns="50800" rIns="50800" bIns="50800" anchor="ctr">
+            <a:spAutoFit/>
+          </a:bodyPr>
+          <a:lstStyle>
+            <a:lvl1pPr>
+              <a:defRPr sz="6000">
+                <a:solidFill>
+                  <a:schemeClr val="accent5"/>
+                </a:solidFill>
+              </a:defRPr>
+            </a:lvl1pPr>
+          </a:lstStyle>
+          <a:p>
+            <a:pPr/>
+            <a:r>
+              <a:t>{“sheet1”: dataframe1}</a:t>
             </a:r>
           </a:p>
         </p:txBody>
@@ -9947,7 +8916,7 @@
       </p:grpSpPr>
       <p:sp>
         <p:nvSpPr>
-          <p:cNvPr id="214" name="Shape 214"/>
+          <p:cNvPr id="216" name="Shape 216"/>
           <p:cNvSpPr/>
           <p:nvPr>
             <p:ph type="title"/>
@@ -9975,14 +8944,14 @@
           <a:p>
             <a:pPr/>
             <a:r>
-              <a:t>Specifying Data Types</a:t>
-            </a:r>
-          </a:p>
-        </p:txBody>
-      </p:sp>
-      <p:sp>
-        <p:nvSpPr>
-          <p:cNvPr id="215" name="Shape 215"/>
+              <a:t>Dataframe from Excel</a:t>
+            </a:r>
+          </a:p>
+        </p:txBody>
+      </p:sp>
+      <p:sp>
+        <p:nvSpPr>
+          <p:cNvPr id="217" name="Shape 217"/>
           <p:cNvSpPr/>
           <p:nvPr/>
         </p:nvSpPr>
@@ -10018,7 +8987,7 @@
               </a:defRPr>
             </a:pPr>
             <a:r>
-              <a:t>pd.read_csv(“path_to_file”,</a:t>
+              <a:t>pd.read_excel(“path_to_file”,</a:t>
             </a:r>
           </a:p>
           <a:p>
@@ -10031,7 +9000,7 @@
               </a:defRPr>
             </a:pPr>
             <a:r>
-              <a:t>             dtype={“ZIP”: “str”})</a:t>
+              <a:t>               sheet_name=“bla”)</a:t>
             </a:r>
           </a:p>
           <a:p>
@@ -10077,7 +9046,7 @@
       </p:grpSpPr>
       <p:sp>
         <p:nvSpPr>
-          <p:cNvPr id="217" name="Shape 217"/>
+          <p:cNvPr id="219" name="Shape 219"/>
           <p:cNvSpPr/>
           <p:nvPr>
             <p:ph type="title"/>
@@ -10112,7 +9081,7 @@
       </p:sp>
       <p:sp>
         <p:nvSpPr>
-          <p:cNvPr id="218" name="Shape 218"/>
+          <p:cNvPr id="220" name="Shape 220"/>
           <p:cNvSpPr/>
           <p:nvPr/>
         </p:nvSpPr>
@@ -10148,7 +9117,7 @@
               </a:defRPr>
             </a:pPr>
             <a:r>
-              <a:t>new_df.to_csv(“path_to_file”)</a:t>
+              <a:t>new_df.to_excel(“path_to_file”)</a:t>
             </a:r>
           </a:p>
           <a:p>
@@ -10194,7 +9163,7 @@
       </p:grpSpPr>
       <p:sp>
         <p:nvSpPr>
-          <p:cNvPr id="220" name="Shape 220"/>
+          <p:cNvPr id="222" name="Shape 222"/>
           <p:cNvSpPr/>
           <p:nvPr>
             <p:ph type="title"/>
@@ -10222,21 +9191,21 @@
           <a:p>
             <a:pPr/>
             <a:r>
-              <a:t>Dataframe from Excel</a:t>
-            </a:r>
-          </a:p>
-        </p:txBody>
-      </p:sp>
-      <p:sp>
-        <p:nvSpPr>
-          <p:cNvPr id="221" name="Shape 221"/>
+              <a:t>Saving a Dataframe</a:t>
+            </a:r>
+          </a:p>
+        </p:txBody>
+      </p:sp>
+      <p:sp>
+        <p:nvSpPr>
+          <p:cNvPr id="223" name="Shape 223"/>
           <p:cNvSpPr/>
           <p:nvPr/>
         </p:nvSpPr>
         <p:spPr>
           <a:xfrm>
-            <a:off x="455296" y="4286249"/>
-            <a:ext cx="12192002" cy="3035301"/>
+            <a:off x="596834" y="4286249"/>
+            <a:ext cx="13118969" cy="3035301"/>
           </a:xfrm>
           <a:prstGeom prst="rect">
             <a:avLst/>
@@ -10265,7 +9234,7 @@
               </a:defRPr>
             </a:pPr>
             <a:r>
-              <a:t>pd.read_excel(“path_to_file”,</a:t>
+              <a:t>new_df.to_excel(“path_to_file”</a:t>
             </a:r>
           </a:p>
           <a:p>
@@ -10278,7 +9247,22 @@
               </a:defRPr>
             </a:pPr>
             <a:r>
-              <a:t>               sheet_name=None)</a:t>
+              <a:t>                 </a:t>
+            </a:r>
+            <a:r>
+              <a:rPr>
+                <a:solidFill>
+                  <a:schemeClr val="accent5">
+                    <a:hueOff val="343847"/>
+                    <a:satOff val="6318"/>
+                    <a:lumOff val="8159"/>
+                  </a:schemeClr>
+                </a:solidFill>
+              </a:rPr>
+              <a:t>index=False</a:t>
+            </a:r>
+            <a:r>
+              <a:t>)</a:t>
             </a:r>
           </a:p>
           <a:p>
@@ -10292,98 +9276,6 @@
             </a:pPr>
             <a:r>
               <a:t> </a:t>
-            </a:r>
-          </a:p>
-        </p:txBody>
-      </p:sp>
-      <p:sp>
-        <p:nvSpPr>
-          <p:cNvPr id="222" name="Shape 222"/>
-          <p:cNvSpPr/>
-          <p:nvPr/>
-        </p:nvSpPr>
-        <p:spPr>
-          <a:xfrm rot="21591301">
-            <a:off x="585310" y="7316851"/>
-            <a:ext cx="1620784" cy="518251"/>
-          </a:xfrm>
-          <a:prstGeom prst="rightArrow">
-            <a:avLst>
-              <a:gd name="adj1" fmla="val 34174"/>
-              <a:gd name="adj2" fmla="val 145948"/>
-            </a:avLst>
-          </a:prstGeom>
-          <a:solidFill>
-            <a:schemeClr val="accent5"/>
-          </a:solidFill>
-          <a:ln w="12700">
-            <a:miter lim="400000"/>
-          </a:ln>
-        </p:spPr>
-        <p:txBody>
-          <a:bodyPr lIns="50800" tIns="50800" rIns="50800" bIns="50800" anchor="ctr"/>
-          <a:lstStyle/>
-          <a:p>
-            <a:pPr algn="ctr">
-              <a:lnSpc>
-                <a:spcPct val="80000"/>
-              </a:lnSpc>
-              <a:spcBef>
-                <a:spcPts val="0"/>
-              </a:spcBef>
-              <a:defRPr cap="all" sz="2800">
-                <a:solidFill>
-                  <a:srgbClr val="FFFFFF"/>
-                </a:solidFill>
-                <a:latin typeface="+mn-lt"/>
-                <a:ea typeface="+mn-ea"/>
-                <a:cs typeface="+mn-cs"/>
-                <a:sym typeface="DIN Condensed"/>
-              </a:defRPr>
-            </a:pPr>
-          </a:p>
-        </p:txBody>
-      </p:sp>
-      <p:sp>
-        <p:nvSpPr>
-          <p:cNvPr id="223" name="Shape 223"/>
-          <p:cNvSpPr/>
-          <p:nvPr/>
-        </p:nvSpPr>
-        <p:spPr>
-          <a:xfrm>
-            <a:off x="2405602" y="7004339"/>
-            <a:ext cx="8057389" cy="1143001"/>
-          </a:xfrm>
-          <a:prstGeom prst="rect">
-            <a:avLst/>
-          </a:prstGeom>
-          <a:ln w="12700">
-            <a:miter lim="400000"/>
-          </a:ln>
-          <a:extLst>
-            <a:ext uri="{C572A759-6A51-4108-AA02-DFA0A04FC94B}">
-              <ma14:wrappingTextBoxFlag xmlns:ma14="http://schemas.microsoft.com/office/mac/drawingml/2011/main" val="1"/>
-            </a:ext>
-          </a:extLst>
-        </p:spPr>
-        <p:txBody>
-          <a:bodyPr wrap="none" lIns="50800" tIns="50800" rIns="50800" bIns="50800" anchor="ctr">
-            <a:spAutoFit/>
-          </a:bodyPr>
-          <a:lstStyle>
-            <a:lvl1pPr>
-              <a:defRPr sz="6000">
-                <a:solidFill>
-                  <a:schemeClr val="accent5"/>
-                </a:solidFill>
-              </a:defRPr>
-            </a:lvl1pPr>
-          </a:lstStyle>
-          <a:p>
-            <a:pPr/>
-            <a:r>
-              <a:t>{“sheet1”: dataframe1}</a:t>
             </a:r>
           </a:p>
         </p:txBody>
@@ -10444,7 +9336,7 @@
           <a:p>
             <a:pPr/>
             <a:r>
-              <a:t>Dataframe from Excel</a:t>
+              <a:t>Filtering and Aggregating</a:t>
             </a:r>
           </a:p>
         </p:txBody>
@@ -10487,7 +9379,7 @@
               </a:defRPr>
             </a:pPr>
             <a:r>
-              <a:t>pd.read_excel(“path_to_file”,</a:t>
+              <a:t>bk = df[‘BORO’] == ‘BROOKLYN’ </a:t>
             </a:r>
           </a:p>
           <a:p>
@@ -10500,7 +9392,7 @@
               </a:defRPr>
             </a:pPr>
             <a:r>
-              <a:t>               sheet_name=“bla”)</a:t>
+              <a:t>df[bk][‘SCORE’].mean()</a:t>
             </a:r>
           </a:p>
           <a:p>
@@ -10574,7 +9466,7 @@
           <a:p>
             <a:pPr/>
             <a:r>
-              <a:t>Saving a Dataframe</a:t>
+              <a:t>Dataframe from columns</a:t>
             </a:r>
           </a:p>
         </p:txBody>
@@ -10587,8 +9479,8 @@
         </p:nvSpPr>
         <p:spPr>
           <a:xfrm>
-            <a:off x="596834" y="4826000"/>
-            <a:ext cx="13118969" cy="1955801"/>
+            <a:off x="434394" y="4826000"/>
+            <a:ext cx="12946701" cy="1955801"/>
           </a:xfrm>
           <a:prstGeom prst="rect">
             <a:avLst/>
@@ -10617,7 +9509,7 @@
               </a:defRPr>
             </a:pPr>
             <a:r>
-              <a:t>new_df.to_excel(“path_to_file”)</a:t>
+              <a:t>columns = [‘revenue’, ‘profit’]</a:t>
             </a:r>
           </a:p>
           <a:p>
@@ -10630,7 +9522,7 @@
               </a:defRPr>
             </a:pPr>
             <a:r>
-              <a:t> </a:t>
+              <a:t>df[columns]</a:t>
             </a:r>
           </a:p>
         </p:txBody>

</xml_diff>